<commit_message>
Adds Progress sponsorship slide
</commit_message>
<xml_diff>
--- a/PreMeeting.pptx
+++ b/PreMeeting.pptx
@@ -9,9 +9,10 @@
     <p:sldId id="257" r:id="rId3"/>
     <p:sldId id="258" r:id="rId4"/>
     <p:sldId id="259" r:id="rId5"/>
-    <p:sldId id="261" r:id="rId6"/>
-    <p:sldId id="262" r:id="rId7"/>
-    <p:sldId id="260" r:id="rId8"/>
+    <p:sldId id="458" r:id="rId6"/>
+    <p:sldId id="261" r:id="rId7"/>
+    <p:sldId id="262" r:id="rId8"/>
+    <p:sldId id="260" r:id="rId9"/>
   </p:sldIdLst>
   <p:sldSz cx="12192000" cy="6858000"/>
   <p:notesSz cx="6858000" cy="9144000"/>
@@ -140,7 +141,7 @@
           <p:cNvPr id="2" name="Title 1">
             <a:extLst>
               <a:ext uri="{FF2B5EF4-FFF2-40B4-BE49-F238E27FC236}">
-                <a16:creationId xmlns:a16="http://schemas.microsoft.com/office/drawing/2014/main" xmlns="" id="{066B7048-55A3-4328-9C02-277B362A066A}"/>
+                <a16:creationId xmlns:a16="http://schemas.microsoft.com/office/drawing/2014/main" id="{066B7048-55A3-4328-9C02-277B362A066A}"/>
               </a:ext>
             </a:extLst>
           </p:cNvPr>
@@ -177,7 +178,7 @@
           <p:cNvPr id="3" name="Subtitle 2">
             <a:extLst>
               <a:ext uri="{FF2B5EF4-FFF2-40B4-BE49-F238E27FC236}">
-                <a16:creationId xmlns:a16="http://schemas.microsoft.com/office/drawing/2014/main" xmlns="" id="{40A52FB1-92EE-4ECB-B2CF-88DD7B269D3C}"/>
+                <a16:creationId xmlns:a16="http://schemas.microsoft.com/office/drawing/2014/main" id="{40A52FB1-92EE-4ECB-B2CF-88DD7B269D3C}"/>
               </a:ext>
             </a:extLst>
           </p:cNvPr>
@@ -247,7 +248,7 @@
           <p:cNvPr id="4" name="Date Placeholder 3">
             <a:extLst>
               <a:ext uri="{FF2B5EF4-FFF2-40B4-BE49-F238E27FC236}">
-                <a16:creationId xmlns:a16="http://schemas.microsoft.com/office/drawing/2014/main" xmlns="" id="{9EF97AFC-1E43-4ACF-A80C-F1E17C71623A}"/>
+                <a16:creationId xmlns:a16="http://schemas.microsoft.com/office/drawing/2014/main" id="{9EF97AFC-1E43-4ACF-A80C-F1E17C71623A}"/>
               </a:ext>
             </a:extLst>
           </p:cNvPr>
@@ -273,7 +274,7 @@
           <a:p>
             <a:fld id="{AE5DB8C5-1F04-44FE-B5DC-B4D028B34EAC}" type="datetimeFigureOut">
               <a:rPr lang="en-US" smtClean="0"/>
-              <a:t>1/22/2019</a:t>
+              <a:t>1/23/2019</a:t>
             </a:fld>
             <a:endParaRPr lang="en-US"/>
           </a:p>
@@ -284,7 +285,7 @@
           <p:cNvPr id="5" name="Footer Placeholder 4">
             <a:extLst>
               <a:ext uri="{FF2B5EF4-FFF2-40B4-BE49-F238E27FC236}">
-                <a16:creationId xmlns:a16="http://schemas.microsoft.com/office/drawing/2014/main" xmlns="" id="{E44D7BD0-B59E-4F7E-A3B4-9EDBF437DA4A}"/>
+                <a16:creationId xmlns:a16="http://schemas.microsoft.com/office/drawing/2014/main" id="{E44D7BD0-B59E-4F7E-A3B4-9EDBF437DA4A}"/>
               </a:ext>
             </a:extLst>
           </p:cNvPr>
@@ -317,7 +318,7 @@
           <p:cNvPr id="6" name="Slide Number Placeholder 5">
             <a:extLst>
               <a:ext uri="{FF2B5EF4-FFF2-40B4-BE49-F238E27FC236}">
-                <a16:creationId xmlns:a16="http://schemas.microsoft.com/office/drawing/2014/main" xmlns="" id="{C74877CD-B7F4-4754-A0A6-69368832986B}"/>
+                <a16:creationId xmlns:a16="http://schemas.microsoft.com/office/drawing/2014/main" id="{C74877CD-B7F4-4754-A0A6-69368832986B}"/>
               </a:ext>
             </a:extLst>
           </p:cNvPr>
@@ -384,7 +385,7 @@
           <p:cNvPr id="2" name="Title 1">
             <a:extLst>
               <a:ext uri="{FF2B5EF4-FFF2-40B4-BE49-F238E27FC236}">
-                <a16:creationId xmlns:a16="http://schemas.microsoft.com/office/drawing/2014/main" xmlns="" id="{A67157A8-3881-49C5-9B34-3F2371FAB7C3}"/>
+                <a16:creationId xmlns:a16="http://schemas.microsoft.com/office/drawing/2014/main" id="{A67157A8-3881-49C5-9B34-3F2371FAB7C3}"/>
               </a:ext>
             </a:extLst>
           </p:cNvPr>
@@ -412,7 +413,7 @@
           <p:cNvPr id="3" name="Vertical Text Placeholder 2">
             <a:extLst>
               <a:ext uri="{FF2B5EF4-FFF2-40B4-BE49-F238E27FC236}">
-                <a16:creationId xmlns:a16="http://schemas.microsoft.com/office/drawing/2014/main" xmlns="" id="{E0383838-3BC6-4FA6-BDA6-0F21DBC46E67}"/>
+                <a16:creationId xmlns:a16="http://schemas.microsoft.com/office/drawing/2014/main" id="{E0383838-3BC6-4FA6-BDA6-0F21DBC46E67}"/>
               </a:ext>
             </a:extLst>
           </p:cNvPr>
@@ -469,7 +470,7 @@
           <p:cNvPr id="4" name="Date Placeholder 3">
             <a:extLst>
               <a:ext uri="{FF2B5EF4-FFF2-40B4-BE49-F238E27FC236}">
-                <a16:creationId xmlns:a16="http://schemas.microsoft.com/office/drawing/2014/main" xmlns="" id="{3EF6E610-4CCE-4CBD-BC7B-E1E2CD98A8F5}"/>
+                <a16:creationId xmlns:a16="http://schemas.microsoft.com/office/drawing/2014/main" id="{3EF6E610-4CCE-4CBD-BC7B-E1E2CD98A8F5}"/>
               </a:ext>
             </a:extLst>
           </p:cNvPr>
@@ -495,7 +496,7 @@
           <a:p>
             <a:fld id="{AE5DB8C5-1F04-44FE-B5DC-B4D028B34EAC}" type="datetimeFigureOut">
               <a:rPr lang="en-US" smtClean="0"/>
-              <a:t>1/22/2019</a:t>
+              <a:t>1/23/2019</a:t>
             </a:fld>
             <a:endParaRPr lang="en-US"/>
           </a:p>
@@ -506,7 +507,7 @@
           <p:cNvPr id="5" name="Footer Placeholder 4">
             <a:extLst>
               <a:ext uri="{FF2B5EF4-FFF2-40B4-BE49-F238E27FC236}">
-                <a16:creationId xmlns:a16="http://schemas.microsoft.com/office/drawing/2014/main" xmlns="" id="{D2AAAE7A-FD8D-4419-931E-639195F4B5CD}"/>
+                <a16:creationId xmlns:a16="http://schemas.microsoft.com/office/drawing/2014/main" id="{D2AAAE7A-FD8D-4419-931E-639195F4B5CD}"/>
               </a:ext>
             </a:extLst>
           </p:cNvPr>
@@ -539,7 +540,7 @@
           <p:cNvPr id="6" name="Slide Number Placeholder 5">
             <a:extLst>
               <a:ext uri="{FF2B5EF4-FFF2-40B4-BE49-F238E27FC236}">
-                <a16:creationId xmlns:a16="http://schemas.microsoft.com/office/drawing/2014/main" xmlns="" id="{E51DA439-ECBE-4884-B27A-A56510BC08C1}"/>
+                <a16:creationId xmlns:a16="http://schemas.microsoft.com/office/drawing/2014/main" id="{E51DA439-ECBE-4884-B27A-A56510BC08C1}"/>
               </a:ext>
             </a:extLst>
           </p:cNvPr>
@@ -606,7 +607,7 @@
           <p:cNvPr id="2" name="Vertical Title 1">
             <a:extLst>
               <a:ext uri="{FF2B5EF4-FFF2-40B4-BE49-F238E27FC236}">
-                <a16:creationId xmlns:a16="http://schemas.microsoft.com/office/drawing/2014/main" xmlns="" id="{CF064377-B71A-4FE1-9D2E-173AF2B10FDF}"/>
+                <a16:creationId xmlns:a16="http://schemas.microsoft.com/office/drawing/2014/main" id="{CF064377-B71A-4FE1-9D2E-173AF2B10FDF}"/>
               </a:ext>
             </a:extLst>
           </p:cNvPr>
@@ -639,7 +640,7 @@
           <p:cNvPr id="3" name="Vertical Text Placeholder 2">
             <a:extLst>
               <a:ext uri="{FF2B5EF4-FFF2-40B4-BE49-F238E27FC236}">
-                <a16:creationId xmlns:a16="http://schemas.microsoft.com/office/drawing/2014/main" xmlns="" id="{A76F34FD-8A25-4E59-96C7-1FD08D285732}"/>
+                <a16:creationId xmlns:a16="http://schemas.microsoft.com/office/drawing/2014/main" id="{A76F34FD-8A25-4E59-96C7-1FD08D285732}"/>
               </a:ext>
             </a:extLst>
           </p:cNvPr>
@@ -701,7 +702,7 @@
           <p:cNvPr id="4" name="Date Placeholder 3">
             <a:extLst>
               <a:ext uri="{FF2B5EF4-FFF2-40B4-BE49-F238E27FC236}">
-                <a16:creationId xmlns:a16="http://schemas.microsoft.com/office/drawing/2014/main" xmlns="" id="{3068B6C5-39D8-4651-905F-242003FD1494}"/>
+                <a16:creationId xmlns:a16="http://schemas.microsoft.com/office/drawing/2014/main" id="{3068B6C5-39D8-4651-905F-242003FD1494}"/>
               </a:ext>
             </a:extLst>
           </p:cNvPr>
@@ -727,7 +728,7 @@
           <a:p>
             <a:fld id="{AE5DB8C5-1F04-44FE-B5DC-B4D028B34EAC}" type="datetimeFigureOut">
               <a:rPr lang="en-US" smtClean="0"/>
-              <a:t>1/22/2019</a:t>
+              <a:t>1/23/2019</a:t>
             </a:fld>
             <a:endParaRPr lang="en-US"/>
           </a:p>
@@ -738,7 +739,7 @@
           <p:cNvPr id="5" name="Footer Placeholder 4">
             <a:extLst>
               <a:ext uri="{FF2B5EF4-FFF2-40B4-BE49-F238E27FC236}">
-                <a16:creationId xmlns:a16="http://schemas.microsoft.com/office/drawing/2014/main" xmlns="" id="{D4DD8E38-69BF-438D-A20A-0BAD35FC96AC}"/>
+                <a16:creationId xmlns:a16="http://schemas.microsoft.com/office/drawing/2014/main" id="{D4DD8E38-69BF-438D-A20A-0BAD35FC96AC}"/>
               </a:ext>
             </a:extLst>
           </p:cNvPr>
@@ -771,7 +772,7 @@
           <p:cNvPr id="6" name="Slide Number Placeholder 5">
             <a:extLst>
               <a:ext uri="{FF2B5EF4-FFF2-40B4-BE49-F238E27FC236}">
-                <a16:creationId xmlns:a16="http://schemas.microsoft.com/office/drawing/2014/main" xmlns="" id="{E81FE665-C1FB-4128-99DE-8A1427CA8EB8}"/>
+                <a16:creationId xmlns:a16="http://schemas.microsoft.com/office/drawing/2014/main" id="{E81FE665-C1FB-4128-99DE-8A1427CA8EB8}"/>
               </a:ext>
             </a:extLst>
           </p:cNvPr>
@@ -813,6 +814,677 @@
   <p:clrMapOvr>
     <a:masterClrMapping/>
   </p:clrMapOvr>
+</p:sldLayout>
+</file>
+
+<file path=ppt/slideLayouts/slideLayout12.xml><?xml version="1.0" encoding="utf-8"?>
+<p:sldLayout xmlns:a="http://schemas.openxmlformats.org/drawingml/2006/main" xmlns:r="http://schemas.openxmlformats.org/officeDocument/2006/relationships" xmlns:p="http://schemas.openxmlformats.org/presentationml/2006/main" userDrawn="1">
+  <p:cSld name="4 Columns with Section Headers">
+    <p:spTree>
+      <p:nvGrpSpPr>
+        <p:cNvPr id="1" name=""/>
+        <p:cNvGrpSpPr/>
+        <p:nvPr/>
+      </p:nvGrpSpPr>
+      <p:grpSpPr>
+        <a:xfrm>
+          <a:off x="0" y="0"/>
+          <a:ext cx="0" cy="0"/>
+          <a:chOff x="0" y="0"/>
+          <a:chExt cx="0" cy="0"/>
+        </a:xfrm>
+      </p:grpSpPr>
+      <p:sp>
+        <p:nvSpPr>
+          <p:cNvPr id="2" name="Title 1"/>
+          <p:cNvSpPr>
+            <a:spLocks noGrp="1"/>
+          </p:cNvSpPr>
+          <p:nvPr>
+            <p:ph type="title" hasCustomPrompt="1"/>
+          </p:nvPr>
+        </p:nvSpPr>
+        <p:spPr>
+          <a:xfrm>
+            <a:off x="620381" y="488362"/>
+            <a:ext cx="10951239" cy="720000"/>
+          </a:xfrm>
+          <a:prstGeom prst="rect">
+            <a:avLst/>
+          </a:prstGeom>
+        </p:spPr>
+        <p:txBody>
+          <a:bodyPr bIns="46800" anchor="ctr" anchorCtr="0"/>
+          <a:lstStyle>
+            <a:lvl1pPr>
+              <a:defRPr sz="3598" b="1">
+                <a:solidFill>
+                  <a:schemeClr val="tx1"/>
+                </a:solidFill>
+              </a:defRPr>
+            </a:lvl1pPr>
+          </a:lstStyle>
+          <a:p>
+            <a:r>
+              <a:rPr lang="en-US" dirty="0"/>
+              <a:t>Click to Edit Master Title Style</a:t>
+            </a:r>
+          </a:p>
+        </p:txBody>
+      </p:sp>
+      <p:sp>
+        <p:nvSpPr>
+          <p:cNvPr id="5" name="Text Placeholder 4">
+            <a:extLst>
+              <a:ext uri="{FF2B5EF4-FFF2-40B4-BE49-F238E27FC236}">
+                <a16:creationId xmlns:a16="http://schemas.microsoft.com/office/drawing/2014/main" id="{27FF3343-CE0D-F344-8838-5208201324CA}"/>
+              </a:ext>
+            </a:extLst>
+          </p:cNvPr>
+          <p:cNvSpPr>
+            <a:spLocks noGrp="1"/>
+          </p:cNvSpPr>
+          <p:nvPr>
+            <p:ph type="body" sz="quarter" idx="10"/>
+          </p:nvPr>
+        </p:nvSpPr>
+        <p:spPr>
+          <a:xfrm>
+            <a:off x="3370559" y="2412000"/>
+            <a:ext cx="2700703" cy="3600000"/>
+          </a:xfrm>
+        </p:spPr>
+        <p:txBody>
+          <a:bodyPr anchor="t">
+            <a:normAutofit/>
+          </a:bodyPr>
+          <a:lstStyle>
+            <a:lvl1pPr>
+              <a:buSzPct val="130000"/>
+              <a:defRPr sz="1400"/>
+            </a:lvl1pPr>
+            <a:lvl2pPr>
+              <a:defRPr sz="1400"/>
+            </a:lvl2pPr>
+            <a:lvl3pPr>
+              <a:defRPr sz="1400"/>
+            </a:lvl3pPr>
+            <a:lvl4pPr>
+              <a:defRPr sz="1400"/>
+            </a:lvl4pPr>
+            <a:lvl5pPr>
+              <a:defRPr sz="1400"/>
+            </a:lvl5pPr>
+          </a:lstStyle>
+          <a:p>
+            <a:pPr lvl="0"/>
+            <a:r>
+              <a:rPr lang="en-US" dirty="0"/>
+              <a:t>Edit Master text styles</a:t>
+            </a:r>
+          </a:p>
+          <a:p>
+            <a:pPr lvl="1"/>
+            <a:r>
+              <a:rPr lang="en-US" dirty="0"/>
+              <a:t>Second level</a:t>
+            </a:r>
+          </a:p>
+          <a:p>
+            <a:pPr lvl="2"/>
+            <a:r>
+              <a:rPr lang="en-US" dirty="0"/>
+              <a:t>Third level</a:t>
+            </a:r>
+          </a:p>
+          <a:p>
+            <a:pPr lvl="3"/>
+            <a:r>
+              <a:rPr lang="en-US" dirty="0"/>
+              <a:t>Fourth level</a:t>
+            </a:r>
+          </a:p>
+          <a:p>
+            <a:pPr lvl="4"/>
+            <a:r>
+              <a:rPr lang="en-US" dirty="0"/>
+              <a:t>Fifth level</a:t>
+            </a:r>
+          </a:p>
+        </p:txBody>
+      </p:sp>
+      <p:sp>
+        <p:nvSpPr>
+          <p:cNvPr id="6" name="Text Placeholder 5">
+            <a:extLst>
+              <a:ext uri="{FF2B5EF4-FFF2-40B4-BE49-F238E27FC236}">
+                <a16:creationId xmlns:a16="http://schemas.microsoft.com/office/drawing/2014/main" id="{058DA236-7B8F-1E49-805A-8FB74441502D}"/>
+              </a:ext>
+            </a:extLst>
+          </p:cNvPr>
+          <p:cNvSpPr>
+            <a:spLocks noGrp="1"/>
+          </p:cNvSpPr>
+          <p:nvPr>
+            <p:ph type="body" sz="quarter" idx="11"/>
+          </p:nvPr>
+        </p:nvSpPr>
+        <p:spPr>
+          <a:xfrm>
+            <a:off x="6120738" y="2421603"/>
+            <a:ext cx="2700703" cy="3600000"/>
+          </a:xfrm>
+        </p:spPr>
+        <p:txBody>
+          <a:bodyPr anchor="t">
+            <a:normAutofit/>
+          </a:bodyPr>
+          <a:lstStyle>
+            <a:lvl1pPr>
+              <a:buSzPct val="130000"/>
+              <a:defRPr sz="1400"/>
+            </a:lvl1pPr>
+            <a:lvl2pPr>
+              <a:defRPr sz="1400"/>
+            </a:lvl2pPr>
+            <a:lvl3pPr>
+              <a:defRPr sz="1400"/>
+            </a:lvl3pPr>
+            <a:lvl4pPr>
+              <a:defRPr sz="1400"/>
+            </a:lvl4pPr>
+            <a:lvl5pPr>
+              <a:defRPr sz="1400"/>
+            </a:lvl5pPr>
+          </a:lstStyle>
+          <a:p>
+            <a:pPr lvl="0"/>
+            <a:r>
+              <a:rPr lang="en-US" dirty="0"/>
+              <a:t>Edit Master text styles</a:t>
+            </a:r>
+          </a:p>
+          <a:p>
+            <a:pPr lvl="1"/>
+            <a:r>
+              <a:rPr lang="en-US" dirty="0"/>
+              <a:t>Second level</a:t>
+            </a:r>
+          </a:p>
+          <a:p>
+            <a:pPr lvl="2"/>
+            <a:r>
+              <a:rPr lang="en-US" dirty="0"/>
+              <a:t>Third level</a:t>
+            </a:r>
+          </a:p>
+          <a:p>
+            <a:pPr lvl="3"/>
+            <a:r>
+              <a:rPr lang="en-US" dirty="0"/>
+              <a:t>Fourth level</a:t>
+            </a:r>
+          </a:p>
+          <a:p>
+            <a:pPr lvl="4"/>
+            <a:r>
+              <a:rPr lang="en-US" dirty="0"/>
+              <a:t>Fifth level</a:t>
+            </a:r>
+          </a:p>
+        </p:txBody>
+      </p:sp>
+      <p:sp>
+        <p:nvSpPr>
+          <p:cNvPr id="8" name="Text Placeholder 7">
+            <a:extLst>
+              <a:ext uri="{FF2B5EF4-FFF2-40B4-BE49-F238E27FC236}">
+                <a16:creationId xmlns:a16="http://schemas.microsoft.com/office/drawing/2014/main" id="{F59DC3BF-6D53-DC43-86C5-7E9071E35C57}"/>
+              </a:ext>
+            </a:extLst>
+          </p:cNvPr>
+          <p:cNvSpPr>
+            <a:spLocks noGrp="1"/>
+          </p:cNvSpPr>
+          <p:nvPr>
+            <p:ph type="body" sz="quarter" idx="12"/>
+          </p:nvPr>
+        </p:nvSpPr>
+        <p:spPr>
+          <a:xfrm>
+            <a:off x="620380" y="2412000"/>
+            <a:ext cx="2700703" cy="3600000"/>
+          </a:xfrm>
+        </p:spPr>
+        <p:txBody>
+          <a:bodyPr anchor="t">
+            <a:normAutofit/>
+          </a:bodyPr>
+          <a:lstStyle>
+            <a:lvl1pPr>
+              <a:buSzPct val="130000"/>
+              <a:defRPr sz="1400"/>
+            </a:lvl1pPr>
+            <a:lvl2pPr>
+              <a:defRPr sz="1400"/>
+            </a:lvl2pPr>
+            <a:lvl3pPr>
+              <a:defRPr sz="1400"/>
+            </a:lvl3pPr>
+            <a:lvl4pPr>
+              <a:defRPr sz="1400"/>
+            </a:lvl4pPr>
+            <a:lvl5pPr>
+              <a:defRPr sz="1400"/>
+            </a:lvl5pPr>
+          </a:lstStyle>
+          <a:p>
+            <a:pPr lvl="0"/>
+            <a:r>
+              <a:rPr lang="en-US" dirty="0"/>
+              <a:t>Edit Master text styles</a:t>
+            </a:r>
+          </a:p>
+          <a:p>
+            <a:pPr lvl="1"/>
+            <a:r>
+              <a:rPr lang="en-US" dirty="0"/>
+              <a:t>Second level</a:t>
+            </a:r>
+          </a:p>
+          <a:p>
+            <a:pPr lvl="2"/>
+            <a:r>
+              <a:rPr lang="en-US" dirty="0"/>
+              <a:t>Third level</a:t>
+            </a:r>
+          </a:p>
+          <a:p>
+            <a:pPr lvl="3"/>
+            <a:r>
+              <a:rPr lang="en-US" dirty="0"/>
+              <a:t>Fourth level</a:t>
+            </a:r>
+          </a:p>
+          <a:p>
+            <a:pPr lvl="4"/>
+            <a:r>
+              <a:rPr lang="en-US" dirty="0"/>
+              <a:t>Fifth level</a:t>
+            </a:r>
+          </a:p>
+        </p:txBody>
+      </p:sp>
+      <p:sp>
+        <p:nvSpPr>
+          <p:cNvPr id="10" name="Text Placeholder 9">
+            <a:extLst>
+              <a:ext uri="{FF2B5EF4-FFF2-40B4-BE49-F238E27FC236}">
+                <a16:creationId xmlns:a16="http://schemas.microsoft.com/office/drawing/2014/main" id="{5350FF42-449F-4D49-BF6C-1ABFDD319876}"/>
+              </a:ext>
+            </a:extLst>
+          </p:cNvPr>
+          <p:cNvSpPr>
+            <a:spLocks noGrp="1"/>
+          </p:cNvSpPr>
+          <p:nvPr>
+            <p:ph type="body" sz="quarter" idx="13" hasCustomPrompt="1"/>
+          </p:nvPr>
+        </p:nvSpPr>
+        <p:spPr>
+          <a:xfrm>
+            <a:off x="6120736" y="1362584"/>
+            <a:ext cx="2700703" cy="914400"/>
+          </a:xfrm>
+        </p:spPr>
+        <p:txBody>
+          <a:bodyPr anchor="b">
+            <a:normAutofit/>
+          </a:bodyPr>
+          <a:lstStyle>
+            <a:lvl1pPr marL="0" indent="0">
+              <a:buNone/>
+              <a:defRPr sz="2000">
+                <a:solidFill>
+                  <a:schemeClr val="accent1"/>
+                </a:solidFill>
+              </a:defRPr>
+            </a:lvl1pPr>
+            <a:lvl2pPr marL="456926" indent="0">
+              <a:buNone/>
+              <a:defRPr/>
+            </a:lvl2pPr>
+            <a:lvl3pPr marL="913852" indent="0">
+              <a:buNone/>
+              <a:defRPr/>
+            </a:lvl3pPr>
+            <a:lvl4pPr marL="1370778" indent="0">
+              <a:buNone/>
+              <a:defRPr/>
+            </a:lvl4pPr>
+            <a:lvl5pPr marL="1827704" indent="0">
+              <a:buNone/>
+              <a:defRPr/>
+            </a:lvl5pPr>
+          </a:lstStyle>
+          <a:p>
+            <a:pPr lvl="0"/>
+            <a:r>
+              <a:rPr lang="en-US" dirty="0"/>
+              <a:t>Title</a:t>
+            </a:r>
+          </a:p>
+        </p:txBody>
+      </p:sp>
+      <p:sp>
+        <p:nvSpPr>
+          <p:cNvPr id="12" name="Text Placeholder 11">
+            <a:extLst>
+              <a:ext uri="{FF2B5EF4-FFF2-40B4-BE49-F238E27FC236}">
+                <a16:creationId xmlns:a16="http://schemas.microsoft.com/office/drawing/2014/main" id="{EBB423DD-5E56-4945-A797-A37DC448BEBA}"/>
+              </a:ext>
+            </a:extLst>
+          </p:cNvPr>
+          <p:cNvSpPr>
+            <a:spLocks noGrp="1"/>
+          </p:cNvSpPr>
+          <p:nvPr>
+            <p:ph type="body" sz="quarter" idx="14" hasCustomPrompt="1"/>
+          </p:nvPr>
+        </p:nvSpPr>
+        <p:spPr>
+          <a:xfrm>
+            <a:off x="3370556" y="1362584"/>
+            <a:ext cx="2700703" cy="914400"/>
+          </a:xfrm>
+        </p:spPr>
+        <p:txBody>
+          <a:bodyPr anchor="b">
+            <a:normAutofit/>
+          </a:bodyPr>
+          <a:lstStyle>
+            <a:lvl1pPr marL="0" indent="0">
+              <a:buNone/>
+              <a:defRPr sz="2000">
+                <a:solidFill>
+                  <a:schemeClr val="accent1"/>
+                </a:solidFill>
+              </a:defRPr>
+            </a:lvl1pPr>
+            <a:lvl2pPr marL="456926" indent="0">
+              <a:buNone/>
+              <a:defRPr/>
+            </a:lvl2pPr>
+            <a:lvl3pPr marL="913852" indent="0">
+              <a:buNone/>
+              <a:defRPr/>
+            </a:lvl3pPr>
+            <a:lvl4pPr marL="1370778" indent="0">
+              <a:buNone/>
+              <a:defRPr/>
+            </a:lvl4pPr>
+            <a:lvl5pPr marL="1827704" indent="0">
+              <a:buNone/>
+              <a:defRPr/>
+            </a:lvl5pPr>
+          </a:lstStyle>
+          <a:p>
+            <a:pPr lvl="0"/>
+            <a:r>
+              <a:rPr lang="en-US" dirty="0"/>
+              <a:t>Title</a:t>
+            </a:r>
+          </a:p>
+        </p:txBody>
+      </p:sp>
+      <p:sp>
+        <p:nvSpPr>
+          <p:cNvPr id="14" name="Text Placeholder 13">
+            <a:extLst>
+              <a:ext uri="{FF2B5EF4-FFF2-40B4-BE49-F238E27FC236}">
+                <a16:creationId xmlns:a16="http://schemas.microsoft.com/office/drawing/2014/main" id="{C08B5960-1182-4C43-A8D4-1B7A70638BA4}"/>
+              </a:ext>
+            </a:extLst>
+          </p:cNvPr>
+          <p:cNvSpPr>
+            <a:spLocks noGrp="1"/>
+          </p:cNvSpPr>
+          <p:nvPr>
+            <p:ph type="body" sz="quarter" idx="15" hasCustomPrompt="1"/>
+          </p:nvPr>
+        </p:nvSpPr>
+        <p:spPr>
+          <a:xfrm>
+            <a:off x="620376" y="1362584"/>
+            <a:ext cx="2700703" cy="914400"/>
+          </a:xfrm>
+        </p:spPr>
+        <p:txBody>
+          <a:bodyPr anchor="b">
+            <a:normAutofit/>
+          </a:bodyPr>
+          <a:lstStyle>
+            <a:lvl1pPr marL="0" indent="0">
+              <a:buNone/>
+              <a:defRPr sz="2000">
+                <a:solidFill>
+                  <a:schemeClr val="accent1"/>
+                </a:solidFill>
+              </a:defRPr>
+            </a:lvl1pPr>
+            <a:lvl2pPr marL="456926" indent="0">
+              <a:buNone/>
+              <a:defRPr>
+                <a:solidFill>
+                  <a:schemeClr val="accent1"/>
+                </a:solidFill>
+              </a:defRPr>
+            </a:lvl2pPr>
+            <a:lvl3pPr marL="913852" indent="0">
+              <a:buNone/>
+              <a:defRPr>
+                <a:solidFill>
+                  <a:schemeClr val="accent1"/>
+                </a:solidFill>
+              </a:defRPr>
+            </a:lvl3pPr>
+            <a:lvl4pPr marL="1370778" indent="0">
+              <a:buNone/>
+              <a:defRPr>
+                <a:solidFill>
+                  <a:schemeClr val="accent1"/>
+                </a:solidFill>
+              </a:defRPr>
+            </a:lvl4pPr>
+            <a:lvl5pPr marL="1827704" indent="0">
+              <a:buNone/>
+              <a:defRPr>
+                <a:solidFill>
+                  <a:schemeClr val="accent1"/>
+                </a:solidFill>
+              </a:defRPr>
+            </a:lvl5pPr>
+          </a:lstStyle>
+          <a:p>
+            <a:pPr lvl="0"/>
+            <a:r>
+              <a:rPr lang="en-US" dirty="0"/>
+              <a:t>Title</a:t>
+            </a:r>
+          </a:p>
+        </p:txBody>
+      </p:sp>
+      <p:sp>
+        <p:nvSpPr>
+          <p:cNvPr id="9" name="Text Placeholder 5">
+            <a:extLst>
+              <a:ext uri="{FF2B5EF4-FFF2-40B4-BE49-F238E27FC236}">
+                <a16:creationId xmlns:a16="http://schemas.microsoft.com/office/drawing/2014/main" id="{15649073-3B20-A54C-AF2B-6D95DBD0C5E5}"/>
+              </a:ext>
+            </a:extLst>
+          </p:cNvPr>
+          <p:cNvSpPr>
+            <a:spLocks noGrp="1"/>
+          </p:cNvSpPr>
+          <p:nvPr>
+            <p:ph type="body" sz="quarter" idx="16"/>
+          </p:nvPr>
+        </p:nvSpPr>
+        <p:spPr>
+          <a:xfrm>
+            <a:off x="8870916" y="2421603"/>
+            <a:ext cx="2700703" cy="3600000"/>
+          </a:xfrm>
+        </p:spPr>
+        <p:txBody>
+          <a:bodyPr anchor="t">
+            <a:normAutofit/>
+          </a:bodyPr>
+          <a:lstStyle>
+            <a:lvl1pPr>
+              <a:buSzPct val="130000"/>
+              <a:defRPr sz="1400"/>
+            </a:lvl1pPr>
+            <a:lvl2pPr>
+              <a:defRPr sz="1400"/>
+            </a:lvl2pPr>
+            <a:lvl3pPr>
+              <a:defRPr sz="1400"/>
+            </a:lvl3pPr>
+            <a:lvl4pPr>
+              <a:defRPr sz="1400"/>
+            </a:lvl4pPr>
+            <a:lvl5pPr>
+              <a:defRPr sz="1400"/>
+            </a:lvl5pPr>
+          </a:lstStyle>
+          <a:p>
+            <a:pPr lvl="0"/>
+            <a:r>
+              <a:rPr lang="en-US" dirty="0"/>
+              <a:t>Edit Master text styles</a:t>
+            </a:r>
+          </a:p>
+          <a:p>
+            <a:pPr lvl="1"/>
+            <a:r>
+              <a:rPr lang="en-US" dirty="0"/>
+              <a:t>Second level</a:t>
+            </a:r>
+          </a:p>
+          <a:p>
+            <a:pPr lvl="2"/>
+            <a:r>
+              <a:rPr lang="en-US" dirty="0"/>
+              <a:t>Third level</a:t>
+            </a:r>
+          </a:p>
+          <a:p>
+            <a:pPr lvl="3"/>
+            <a:r>
+              <a:rPr lang="en-US" dirty="0"/>
+              <a:t>Fourth level</a:t>
+            </a:r>
+          </a:p>
+          <a:p>
+            <a:pPr lvl="4"/>
+            <a:r>
+              <a:rPr lang="en-US" dirty="0"/>
+              <a:t>Fifth level</a:t>
+            </a:r>
+          </a:p>
+        </p:txBody>
+      </p:sp>
+      <p:sp>
+        <p:nvSpPr>
+          <p:cNvPr id="11" name="Text Placeholder 9">
+            <a:extLst>
+              <a:ext uri="{FF2B5EF4-FFF2-40B4-BE49-F238E27FC236}">
+                <a16:creationId xmlns:a16="http://schemas.microsoft.com/office/drawing/2014/main" id="{70D29F0D-0984-784F-A0A5-2D40C3955A73}"/>
+              </a:ext>
+            </a:extLst>
+          </p:cNvPr>
+          <p:cNvSpPr>
+            <a:spLocks noGrp="1"/>
+          </p:cNvSpPr>
+          <p:nvPr>
+            <p:ph type="body" sz="quarter" idx="17" hasCustomPrompt="1"/>
+          </p:nvPr>
+        </p:nvSpPr>
+        <p:spPr>
+          <a:xfrm>
+            <a:off x="8870916" y="1362584"/>
+            <a:ext cx="2700703" cy="914400"/>
+          </a:xfrm>
+        </p:spPr>
+        <p:txBody>
+          <a:bodyPr anchor="b">
+            <a:normAutofit/>
+          </a:bodyPr>
+          <a:lstStyle>
+            <a:lvl1pPr marL="0" indent="0">
+              <a:buNone/>
+              <a:defRPr sz="2000">
+                <a:solidFill>
+                  <a:schemeClr val="accent1"/>
+                </a:solidFill>
+              </a:defRPr>
+            </a:lvl1pPr>
+            <a:lvl2pPr marL="456926" indent="0">
+              <a:buNone/>
+              <a:defRPr/>
+            </a:lvl2pPr>
+            <a:lvl3pPr marL="913852" indent="0">
+              <a:buNone/>
+              <a:defRPr/>
+            </a:lvl3pPr>
+            <a:lvl4pPr marL="1370778" indent="0">
+              <a:buNone/>
+              <a:defRPr/>
+            </a:lvl4pPr>
+            <a:lvl5pPr marL="1827704" indent="0">
+              <a:buNone/>
+              <a:defRPr/>
+            </a:lvl5pPr>
+          </a:lstStyle>
+          <a:p>
+            <a:pPr lvl="0"/>
+            <a:r>
+              <a:rPr lang="en-US" dirty="0"/>
+              <a:t>Title</a:t>
+            </a:r>
+          </a:p>
+        </p:txBody>
+      </p:sp>
+    </p:spTree>
+    <p:extLst>
+      <p:ext uri="{BB962C8B-B14F-4D97-AF65-F5344CB8AC3E}">
+        <p14:creationId xmlns:p14="http://schemas.microsoft.com/office/powerpoint/2010/main" val="810510258"/>
+      </p:ext>
+    </p:extLst>
+  </p:cSld>
+  <p:clrMapOvr>
+    <a:overrideClrMapping bg1="lt1" tx1="dk1" bg2="lt2" tx2="dk2" accent1="accent1" accent2="accent2" accent3="accent3" accent4="accent4" accent5="accent5" accent6="accent6" hlink="hlink" folHlink="folHlink"/>
+  </p:clrMapOvr>
+  <p:transition spd="slow">
+    <p:push dir="u"/>
+  </p:transition>
+  <p:extLst mod="1">
+    <p:ext uri="{DCECCB84-F9BA-43D5-87BE-67443E8EF086}">
+      <p15:sldGuideLst xmlns:p15="http://schemas.microsoft.com/office/powerpoint/2012/main">
+        <p15:guide id="7" orient="horz" pos="2160">
+          <p15:clr>
+            <a:srgbClr val="FBAE40"/>
+          </p15:clr>
+        </p15:guide>
+        <p15:guide id="8" pos="3839">
+          <p15:clr>
+            <a:srgbClr val="FBAE40"/>
+          </p15:clr>
+        </p15:guide>
+      </p15:sldGuideLst>
+    </p:ext>
+  </p:extLst>
 </p:sldLayout>
 </file>
 
@@ -838,7 +1510,7 @@
           <p:cNvPr id="2" name="Title 1">
             <a:extLst>
               <a:ext uri="{FF2B5EF4-FFF2-40B4-BE49-F238E27FC236}">
-                <a16:creationId xmlns:a16="http://schemas.microsoft.com/office/drawing/2014/main" xmlns="" id="{BBF77585-98A7-4642-B1A7-4C7CBC4FF435}"/>
+                <a16:creationId xmlns:a16="http://schemas.microsoft.com/office/drawing/2014/main" id="{BBF77585-98A7-4642-B1A7-4C7CBC4FF435}"/>
               </a:ext>
             </a:extLst>
           </p:cNvPr>
@@ -866,7 +1538,7 @@
           <p:cNvPr id="3" name="Content Placeholder 2">
             <a:extLst>
               <a:ext uri="{FF2B5EF4-FFF2-40B4-BE49-F238E27FC236}">
-                <a16:creationId xmlns:a16="http://schemas.microsoft.com/office/drawing/2014/main" xmlns="" id="{B1FA6E10-6BFF-4234-837B-BD1B6F3C03E0}"/>
+                <a16:creationId xmlns:a16="http://schemas.microsoft.com/office/drawing/2014/main" id="{B1FA6E10-6BFF-4234-837B-BD1B6F3C03E0}"/>
               </a:ext>
             </a:extLst>
           </p:cNvPr>
@@ -923,7 +1595,7 @@
           <p:cNvPr id="4" name="Date Placeholder 3">
             <a:extLst>
               <a:ext uri="{FF2B5EF4-FFF2-40B4-BE49-F238E27FC236}">
-                <a16:creationId xmlns:a16="http://schemas.microsoft.com/office/drawing/2014/main" xmlns="" id="{9A20403A-A969-4EC7-B4D1-24BC0189DE28}"/>
+                <a16:creationId xmlns:a16="http://schemas.microsoft.com/office/drawing/2014/main" id="{9A20403A-A969-4EC7-B4D1-24BC0189DE28}"/>
               </a:ext>
             </a:extLst>
           </p:cNvPr>
@@ -949,7 +1621,7 @@
           <a:p>
             <a:fld id="{AE5DB8C5-1F04-44FE-B5DC-B4D028B34EAC}" type="datetimeFigureOut">
               <a:rPr lang="en-US" smtClean="0"/>
-              <a:t>1/22/2019</a:t>
+              <a:t>1/23/2019</a:t>
             </a:fld>
             <a:endParaRPr lang="en-US"/>
           </a:p>
@@ -960,7 +1632,7 @@
           <p:cNvPr id="5" name="Footer Placeholder 4">
             <a:extLst>
               <a:ext uri="{FF2B5EF4-FFF2-40B4-BE49-F238E27FC236}">
-                <a16:creationId xmlns:a16="http://schemas.microsoft.com/office/drawing/2014/main" xmlns="" id="{5E7CC0BE-C1F2-4FD5-BC88-8EEAAD15DEA5}"/>
+                <a16:creationId xmlns:a16="http://schemas.microsoft.com/office/drawing/2014/main" id="{5E7CC0BE-C1F2-4FD5-BC88-8EEAAD15DEA5}"/>
               </a:ext>
             </a:extLst>
           </p:cNvPr>
@@ -993,7 +1665,7 @@
           <p:cNvPr id="6" name="Slide Number Placeholder 5">
             <a:extLst>
               <a:ext uri="{FF2B5EF4-FFF2-40B4-BE49-F238E27FC236}">
-                <a16:creationId xmlns:a16="http://schemas.microsoft.com/office/drawing/2014/main" xmlns="" id="{B96CEAE4-4D84-483E-AF99-46DAB4A5FE50}"/>
+                <a16:creationId xmlns:a16="http://schemas.microsoft.com/office/drawing/2014/main" id="{B96CEAE4-4D84-483E-AF99-46DAB4A5FE50}"/>
               </a:ext>
             </a:extLst>
           </p:cNvPr>
@@ -1060,7 +1732,7 @@
           <p:cNvPr id="2" name="Title 1">
             <a:extLst>
               <a:ext uri="{FF2B5EF4-FFF2-40B4-BE49-F238E27FC236}">
-                <a16:creationId xmlns:a16="http://schemas.microsoft.com/office/drawing/2014/main" xmlns="" id="{743A71EA-574D-474A-9495-5B72185988E4}"/>
+                <a16:creationId xmlns:a16="http://schemas.microsoft.com/office/drawing/2014/main" id="{743A71EA-574D-474A-9495-5B72185988E4}"/>
               </a:ext>
             </a:extLst>
           </p:cNvPr>
@@ -1097,7 +1769,7 @@
           <p:cNvPr id="3" name="Text Placeholder 2">
             <a:extLst>
               <a:ext uri="{FF2B5EF4-FFF2-40B4-BE49-F238E27FC236}">
-                <a16:creationId xmlns:a16="http://schemas.microsoft.com/office/drawing/2014/main" xmlns="" id="{547AAAD6-0A20-41E4-A9F4-22C6119CFE27}"/>
+                <a16:creationId xmlns:a16="http://schemas.microsoft.com/office/drawing/2014/main" id="{547AAAD6-0A20-41E4-A9F4-22C6119CFE27}"/>
               </a:ext>
             </a:extLst>
           </p:cNvPr>
@@ -1222,7 +1894,7 @@
           <p:cNvPr id="4" name="Date Placeholder 3">
             <a:extLst>
               <a:ext uri="{FF2B5EF4-FFF2-40B4-BE49-F238E27FC236}">
-                <a16:creationId xmlns:a16="http://schemas.microsoft.com/office/drawing/2014/main" xmlns="" id="{8726C8B8-39C7-4B07-B9FA-67A37E5CFDA5}"/>
+                <a16:creationId xmlns:a16="http://schemas.microsoft.com/office/drawing/2014/main" id="{8726C8B8-39C7-4B07-B9FA-67A37E5CFDA5}"/>
               </a:ext>
             </a:extLst>
           </p:cNvPr>
@@ -1248,7 +1920,7 @@
           <a:p>
             <a:fld id="{AE5DB8C5-1F04-44FE-B5DC-B4D028B34EAC}" type="datetimeFigureOut">
               <a:rPr lang="en-US" smtClean="0"/>
-              <a:t>1/22/2019</a:t>
+              <a:t>1/23/2019</a:t>
             </a:fld>
             <a:endParaRPr lang="en-US"/>
           </a:p>
@@ -1259,7 +1931,7 @@
           <p:cNvPr id="5" name="Footer Placeholder 4">
             <a:extLst>
               <a:ext uri="{FF2B5EF4-FFF2-40B4-BE49-F238E27FC236}">
-                <a16:creationId xmlns:a16="http://schemas.microsoft.com/office/drawing/2014/main" xmlns="" id="{DD4CC456-8548-4C07-84C3-0D76CB0CAC38}"/>
+                <a16:creationId xmlns:a16="http://schemas.microsoft.com/office/drawing/2014/main" id="{DD4CC456-8548-4C07-84C3-0D76CB0CAC38}"/>
               </a:ext>
             </a:extLst>
           </p:cNvPr>
@@ -1292,7 +1964,7 @@
           <p:cNvPr id="6" name="Slide Number Placeholder 5">
             <a:extLst>
               <a:ext uri="{FF2B5EF4-FFF2-40B4-BE49-F238E27FC236}">
-                <a16:creationId xmlns:a16="http://schemas.microsoft.com/office/drawing/2014/main" xmlns="" id="{8B57E932-5801-4783-B235-F71ECFAAAB8F}"/>
+                <a16:creationId xmlns:a16="http://schemas.microsoft.com/office/drawing/2014/main" id="{8B57E932-5801-4783-B235-F71ECFAAAB8F}"/>
               </a:ext>
             </a:extLst>
           </p:cNvPr>
@@ -1359,7 +2031,7 @@
           <p:cNvPr id="2" name="Title 1">
             <a:extLst>
               <a:ext uri="{FF2B5EF4-FFF2-40B4-BE49-F238E27FC236}">
-                <a16:creationId xmlns:a16="http://schemas.microsoft.com/office/drawing/2014/main" xmlns="" id="{8CB1D1A6-EB11-4240-92E4-9CD1F4B77C1C}"/>
+                <a16:creationId xmlns:a16="http://schemas.microsoft.com/office/drawing/2014/main" id="{8CB1D1A6-EB11-4240-92E4-9CD1F4B77C1C}"/>
               </a:ext>
             </a:extLst>
           </p:cNvPr>
@@ -1387,7 +2059,7 @@
           <p:cNvPr id="3" name="Content Placeholder 2">
             <a:extLst>
               <a:ext uri="{FF2B5EF4-FFF2-40B4-BE49-F238E27FC236}">
-                <a16:creationId xmlns:a16="http://schemas.microsoft.com/office/drawing/2014/main" xmlns="" id="{640D2B38-5A21-4AA0-88DD-9C585458BDFF}"/>
+                <a16:creationId xmlns:a16="http://schemas.microsoft.com/office/drawing/2014/main" id="{640D2B38-5A21-4AA0-88DD-9C585458BDFF}"/>
               </a:ext>
             </a:extLst>
           </p:cNvPr>
@@ -1449,7 +2121,7 @@
           <p:cNvPr id="4" name="Content Placeholder 3">
             <a:extLst>
               <a:ext uri="{FF2B5EF4-FFF2-40B4-BE49-F238E27FC236}">
-                <a16:creationId xmlns:a16="http://schemas.microsoft.com/office/drawing/2014/main" xmlns="" id="{8B191184-5A29-465D-BE62-27A3A95B462F}"/>
+                <a16:creationId xmlns:a16="http://schemas.microsoft.com/office/drawing/2014/main" id="{8B191184-5A29-465D-BE62-27A3A95B462F}"/>
               </a:ext>
             </a:extLst>
           </p:cNvPr>
@@ -1511,7 +2183,7 @@
           <p:cNvPr id="5" name="Date Placeholder 4">
             <a:extLst>
               <a:ext uri="{FF2B5EF4-FFF2-40B4-BE49-F238E27FC236}">
-                <a16:creationId xmlns:a16="http://schemas.microsoft.com/office/drawing/2014/main" xmlns="" id="{71E5F63A-F8BE-4B01-BE0E-CBB3772D1966}"/>
+                <a16:creationId xmlns:a16="http://schemas.microsoft.com/office/drawing/2014/main" id="{71E5F63A-F8BE-4B01-BE0E-CBB3772D1966}"/>
               </a:ext>
             </a:extLst>
           </p:cNvPr>
@@ -1537,7 +2209,7 @@
           <a:p>
             <a:fld id="{AE5DB8C5-1F04-44FE-B5DC-B4D028B34EAC}" type="datetimeFigureOut">
               <a:rPr lang="en-US" smtClean="0"/>
-              <a:t>1/22/2019</a:t>
+              <a:t>1/23/2019</a:t>
             </a:fld>
             <a:endParaRPr lang="en-US"/>
           </a:p>
@@ -1548,7 +2220,7 @@
           <p:cNvPr id="6" name="Footer Placeholder 5">
             <a:extLst>
               <a:ext uri="{FF2B5EF4-FFF2-40B4-BE49-F238E27FC236}">
-                <a16:creationId xmlns:a16="http://schemas.microsoft.com/office/drawing/2014/main" xmlns="" id="{556D3888-4CBA-4529-807F-FF4F195F6479}"/>
+                <a16:creationId xmlns:a16="http://schemas.microsoft.com/office/drawing/2014/main" id="{556D3888-4CBA-4529-807F-FF4F195F6479}"/>
               </a:ext>
             </a:extLst>
           </p:cNvPr>
@@ -1581,7 +2253,7 @@
           <p:cNvPr id="7" name="Slide Number Placeholder 6">
             <a:extLst>
               <a:ext uri="{FF2B5EF4-FFF2-40B4-BE49-F238E27FC236}">
-                <a16:creationId xmlns:a16="http://schemas.microsoft.com/office/drawing/2014/main" xmlns="" id="{6394DF94-DDD1-4A6F-938C-AD7BB0B1837E}"/>
+                <a16:creationId xmlns:a16="http://schemas.microsoft.com/office/drawing/2014/main" id="{6394DF94-DDD1-4A6F-938C-AD7BB0B1837E}"/>
               </a:ext>
             </a:extLst>
           </p:cNvPr>
@@ -1648,7 +2320,7 @@
           <p:cNvPr id="2" name="Title 1">
             <a:extLst>
               <a:ext uri="{FF2B5EF4-FFF2-40B4-BE49-F238E27FC236}">
-                <a16:creationId xmlns:a16="http://schemas.microsoft.com/office/drawing/2014/main" xmlns="" id="{446491AB-16BC-4A45-BCFF-46EB95A3CB69}"/>
+                <a16:creationId xmlns:a16="http://schemas.microsoft.com/office/drawing/2014/main" id="{446491AB-16BC-4A45-BCFF-46EB95A3CB69}"/>
               </a:ext>
             </a:extLst>
           </p:cNvPr>
@@ -1682,7 +2354,7 @@
           <p:cNvPr id="3" name="Text Placeholder 2">
             <a:extLst>
               <a:ext uri="{FF2B5EF4-FFF2-40B4-BE49-F238E27FC236}">
-                <a16:creationId xmlns:a16="http://schemas.microsoft.com/office/drawing/2014/main" xmlns="" id="{FFA889C8-84D5-44DE-80C8-0DD98B1B8226}"/>
+                <a16:creationId xmlns:a16="http://schemas.microsoft.com/office/drawing/2014/main" id="{FFA889C8-84D5-44DE-80C8-0DD98B1B8226}"/>
               </a:ext>
             </a:extLst>
           </p:cNvPr>
@@ -1753,7 +2425,7 @@
           <p:cNvPr id="4" name="Content Placeholder 3">
             <a:extLst>
               <a:ext uri="{FF2B5EF4-FFF2-40B4-BE49-F238E27FC236}">
-                <a16:creationId xmlns:a16="http://schemas.microsoft.com/office/drawing/2014/main" xmlns="" id="{1143F6CA-666F-49C6-81A4-D0750A9D1A23}"/>
+                <a16:creationId xmlns:a16="http://schemas.microsoft.com/office/drawing/2014/main" id="{1143F6CA-666F-49C6-81A4-D0750A9D1A23}"/>
               </a:ext>
             </a:extLst>
           </p:cNvPr>
@@ -1815,7 +2487,7 @@
           <p:cNvPr id="5" name="Text Placeholder 4">
             <a:extLst>
               <a:ext uri="{FF2B5EF4-FFF2-40B4-BE49-F238E27FC236}">
-                <a16:creationId xmlns:a16="http://schemas.microsoft.com/office/drawing/2014/main" xmlns="" id="{59ECE78C-2162-4135-941E-20D99E0965B8}"/>
+                <a16:creationId xmlns:a16="http://schemas.microsoft.com/office/drawing/2014/main" id="{59ECE78C-2162-4135-941E-20D99E0965B8}"/>
               </a:ext>
             </a:extLst>
           </p:cNvPr>
@@ -1886,7 +2558,7 @@
           <p:cNvPr id="6" name="Content Placeholder 5">
             <a:extLst>
               <a:ext uri="{FF2B5EF4-FFF2-40B4-BE49-F238E27FC236}">
-                <a16:creationId xmlns:a16="http://schemas.microsoft.com/office/drawing/2014/main" xmlns="" id="{2DE2BC03-B5B9-455E-971F-D7BDE54B6214}"/>
+                <a16:creationId xmlns:a16="http://schemas.microsoft.com/office/drawing/2014/main" id="{2DE2BC03-B5B9-455E-971F-D7BDE54B6214}"/>
               </a:ext>
             </a:extLst>
           </p:cNvPr>
@@ -1949,7 +2621,7 @@
           <p:cNvPr id="7" name="Date Placeholder 6">
             <a:extLst>
               <a:ext uri="{FF2B5EF4-FFF2-40B4-BE49-F238E27FC236}">
-                <a16:creationId xmlns:a16="http://schemas.microsoft.com/office/drawing/2014/main" xmlns="" id="{C00FD605-6B88-44A8-A4B1-91EB5065FE0F}"/>
+                <a16:creationId xmlns:a16="http://schemas.microsoft.com/office/drawing/2014/main" id="{C00FD605-6B88-44A8-A4B1-91EB5065FE0F}"/>
               </a:ext>
             </a:extLst>
           </p:cNvPr>
@@ -1975,7 +2647,7 @@
           <a:p>
             <a:fld id="{AE5DB8C5-1F04-44FE-B5DC-B4D028B34EAC}" type="datetimeFigureOut">
               <a:rPr lang="en-US" smtClean="0"/>
-              <a:t>1/22/2019</a:t>
+              <a:t>1/23/2019</a:t>
             </a:fld>
             <a:endParaRPr lang="en-US"/>
           </a:p>
@@ -1986,7 +2658,7 @@
           <p:cNvPr id="8" name="Footer Placeholder 7">
             <a:extLst>
               <a:ext uri="{FF2B5EF4-FFF2-40B4-BE49-F238E27FC236}">
-                <a16:creationId xmlns:a16="http://schemas.microsoft.com/office/drawing/2014/main" xmlns="" id="{EEA6B543-2896-4C02-85ED-4452B90B3B25}"/>
+                <a16:creationId xmlns:a16="http://schemas.microsoft.com/office/drawing/2014/main" id="{EEA6B543-2896-4C02-85ED-4452B90B3B25}"/>
               </a:ext>
             </a:extLst>
           </p:cNvPr>
@@ -2019,7 +2691,7 @@
           <p:cNvPr id="9" name="Slide Number Placeholder 8">
             <a:extLst>
               <a:ext uri="{FF2B5EF4-FFF2-40B4-BE49-F238E27FC236}">
-                <a16:creationId xmlns:a16="http://schemas.microsoft.com/office/drawing/2014/main" xmlns="" id="{F5F67A68-4759-4010-936E-534E46072864}"/>
+                <a16:creationId xmlns:a16="http://schemas.microsoft.com/office/drawing/2014/main" id="{F5F67A68-4759-4010-936E-534E46072864}"/>
               </a:ext>
             </a:extLst>
           </p:cNvPr>
@@ -2086,7 +2758,7 @@
           <p:cNvPr id="2" name="Title 1">
             <a:extLst>
               <a:ext uri="{FF2B5EF4-FFF2-40B4-BE49-F238E27FC236}">
-                <a16:creationId xmlns:a16="http://schemas.microsoft.com/office/drawing/2014/main" xmlns="" id="{B01885F7-8A35-4707-BC45-370D18B08507}"/>
+                <a16:creationId xmlns:a16="http://schemas.microsoft.com/office/drawing/2014/main" id="{B01885F7-8A35-4707-BC45-370D18B08507}"/>
               </a:ext>
             </a:extLst>
           </p:cNvPr>
@@ -2114,7 +2786,7 @@
           <p:cNvPr id="3" name="Date Placeholder 2">
             <a:extLst>
               <a:ext uri="{FF2B5EF4-FFF2-40B4-BE49-F238E27FC236}">
-                <a16:creationId xmlns:a16="http://schemas.microsoft.com/office/drawing/2014/main" xmlns="" id="{B812D0E7-F211-40E4-978A-A4921C2A204F}"/>
+                <a16:creationId xmlns:a16="http://schemas.microsoft.com/office/drawing/2014/main" id="{B812D0E7-F211-40E4-978A-A4921C2A204F}"/>
               </a:ext>
             </a:extLst>
           </p:cNvPr>
@@ -2140,7 +2812,7 @@
           <a:p>
             <a:fld id="{AE5DB8C5-1F04-44FE-B5DC-B4D028B34EAC}" type="datetimeFigureOut">
               <a:rPr lang="en-US" smtClean="0"/>
-              <a:t>1/22/2019</a:t>
+              <a:t>1/23/2019</a:t>
             </a:fld>
             <a:endParaRPr lang="en-US"/>
           </a:p>
@@ -2151,7 +2823,7 @@
           <p:cNvPr id="4" name="Footer Placeholder 3">
             <a:extLst>
               <a:ext uri="{FF2B5EF4-FFF2-40B4-BE49-F238E27FC236}">
-                <a16:creationId xmlns:a16="http://schemas.microsoft.com/office/drawing/2014/main" xmlns="" id="{FD0950B3-9FC3-49C6-8DDA-0C2422F12384}"/>
+                <a16:creationId xmlns:a16="http://schemas.microsoft.com/office/drawing/2014/main" id="{FD0950B3-9FC3-49C6-8DDA-0C2422F12384}"/>
               </a:ext>
             </a:extLst>
           </p:cNvPr>
@@ -2184,7 +2856,7 @@
           <p:cNvPr id="5" name="Slide Number Placeholder 4">
             <a:extLst>
               <a:ext uri="{FF2B5EF4-FFF2-40B4-BE49-F238E27FC236}">
-                <a16:creationId xmlns:a16="http://schemas.microsoft.com/office/drawing/2014/main" xmlns="" id="{1BD0C7CC-A016-4D44-8F59-3B6E1BE68238}"/>
+                <a16:creationId xmlns:a16="http://schemas.microsoft.com/office/drawing/2014/main" id="{1BD0C7CC-A016-4D44-8F59-3B6E1BE68238}"/>
               </a:ext>
             </a:extLst>
           </p:cNvPr>
@@ -2251,7 +2923,7 @@
           <p:cNvPr id="2" name="Date Placeholder 1">
             <a:extLst>
               <a:ext uri="{FF2B5EF4-FFF2-40B4-BE49-F238E27FC236}">
-                <a16:creationId xmlns:a16="http://schemas.microsoft.com/office/drawing/2014/main" xmlns="" id="{23BF0D8E-74A0-4266-9661-2D1BF88E8E18}"/>
+                <a16:creationId xmlns:a16="http://schemas.microsoft.com/office/drawing/2014/main" id="{23BF0D8E-74A0-4266-9661-2D1BF88E8E18}"/>
               </a:ext>
             </a:extLst>
           </p:cNvPr>
@@ -2277,7 +2949,7 @@
           <a:p>
             <a:fld id="{AE5DB8C5-1F04-44FE-B5DC-B4D028B34EAC}" type="datetimeFigureOut">
               <a:rPr lang="en-US" smtClean="0"/>
-              <a:t>1/22/2019</a:t>
+              <a:t>1/23/2019</a:t>
             </a:fld>
             <a:endParaRPr lang="en-US"/>
           </a:p>
@@ -2288,7 +2960,7 @@
           <p:cNvPr id="3" name="Footer Placeholder 2">
             <a:extLst>
               <a:ext uri="{FF2B5EF4-FFF2-40B4-BE49-F238E27FC236}">
-                <a16:creationId xmlns:a16="http://schemas.microsoft.com/office/drawing/2014/main" xmlns="" id="{31DA4D65-3140-46DF-8262-0BB2AF339D95}"/>
+                <a16:creationId xmlns:a16="http://schemas.microsoft.com/office/drawing/2014/main" id="{31DA4D65-3140-46DF-8262-0BB2AF339D95}"/>
               </a:ext>
             </a:extLst>
           </p:cNvPr>
@@ -2321,7 +2993,7 @@
           <p:cNvPr id="4" name="Slide Number Placeholder 3">
             <a:extLst>
               <a:ext uri="{FF2B5EF4-FFF2-40B4-BE49-F238E27FC236}">
-                <a16:creationId xmlns:a16="http://schemas.microsoft.com/office/drawing/2014/main" xmlns="" id="{AB3399C6-DDA1-4957-87F7-1B186744E201}"/>
+                <a16:creationId xmlns:a16="http://schemas.microsoft.com/office/drawing/2014/main" id="{AB3399C6-DDA1-4957-87F7-1B186744E201}"/>
               </a:ext>
             </a:extLst>
           </p:cNvPr>
@@ -2388,7 +3060,7 @@
           <p:cNvPr id="2" name="Title 1">
             <a:extLst>
               <a:ext uri="{FF2B5EF4-FFF2-40B4-BE49-F238E27FC236}">
-                <a16:creationId xmlns:a16="http://schemas.microsoft.com/office/drawing/2014/main" xmlns="" id="{57DA9587-55FE-4F82-A586-1CB145F0B11E}"/>
+                <a16:creationId xmlns:a16="http://schemas.microsoft.com/office/drawing/2014/main" id="{57DA9587-55FE-4F82-A586-1CB145F0B11E}"/>
               </a:ext>
             </a:extLst>
           </p:cNvPr>
@@ -2426,7 +3098,7 @@
           <p:cNvPr id="3" name="Content Placeholder 2">
             <a:extLst>
               <a:ext uri="{FF2B5EF4-FFF2-40B4-BE49-F238E27FC236}">
-                <a16:creationId xmlns:a16="http://schemas.microsoft.com/office/drawing/2014/main" xmlns="" id="{6C53B660-85C5-4C17-804C-EBB8338572BF}"/>
+                <a16:creationId xmlns:a16="http://schemas.microsoft.com/office/drawing/2014/main" id="{6C53B660-85C5-4C17-804C-EBB8338572BF}"/>
               </a:ext>
             </a:extLst>
           </p:cNvPr>
@@ -2516,7 +3188,7 @@
           <p:cNvPr id="4" name="Text Placeholder 3">
             <a:extLst>
               <a:ext uri="{FF2B5EF4-FFF2-40B4-BE49-F238E27FC236}">
-                <a16:creationId xmlns:a16="http://schemas.microsoft.com/office/drawing/2014/main" xmlns="" id="{95375D0F-6943-4132-A580-FAC6DE52B22A}"/>
+                <a16:creationId xmlns:a16="http://schemas.microsoft.com/office/drawing/2014/main" id="{95375D0F-6943-4132-A580-FAC6DE52B22A}"/>
               </a:ext>
             </a:extLst>
           </p:cNvPr>
@@ -2587,7 +3259,7 @@
           <p:cNvPr id="5" name="Date Placeholder 4">
             <a:extLst>
               <a:ext uri="{FF2B5EF4-FFF2-40B4-BE49-F238E27FC236}">
-                <a16:creationId xmlns:a16="http://schemas.microsoft.com/office/drawing/2014/main" xmlns="" id="{BDBC298F-5BB0-41AA-9CC2-9D612CD57AD2}"/>
+                <a16:creationId xmlns:a16="http://schemas.microsoft.com/office/drawing/2014/main" id="{BDBC298F-5BB0-41AA-9CC2-9D612CD57AD2}"/>
               </a:ext>
             </a:extLst>
           </p:cNvPr>
@@ -2613,7 +3285,7 @@
           <a:p>
             <a:fld id="{AE5DB8C5-1F04-44FE-B5DC-B4D028B34EAC}" type="datetimeFigureOut">
               <a:rPr lang="en-US" smtClean="0"/>
-              <a:t>1/22/2019</a:t>
+              <a:t>1/23/2019</a:t>
             </a:fld>
             <a:endParaRPr lang="en-US"/>
           </a:p>
@@ -2624,7 +3296,7 @@
           <p:cNvPr id="6" name="Footer Placeholder 5">
             <a:extLst>
               <a:ext uri="{FF2B5EF4-FFF2-40B4-BE49-F238E27FC236}">
-                <a16:creationId xmlns:a16="http://schemas.microsoft.com/office/drawing/2014/main" xmlns="" id="{E8FFEE02-99A9-4B63-BEF1-D1518B1725BD}"/>
+                <a16:creationId xmlns:a16="http://schemas.microsoft.com/office/drawing/2014/main" id="{E8FFEE02-99A9-4B63-BEF1-D1518B1725BD}"/>
               </a:ext>
             </a:extLst>
           </p:cNvPr>
@@ -2657,7 +3329,7 @@
           <p:cNvPr id="7" name="Slide Number Placeholder 6">
             <a:extLst>
               <a:ext uri="{FF2B5EF4-FFF2-40B4-BE49-F238E27FC236}">
-                <a16:creationId xmlns:a16="http://schemas.microsoft.com/office/drawing/2014/main" xmlns="" id="{ADE125D3-A013-4E71-B0A9-0B9A7DABB9A1}"/>
+                <a16:creationId xmlns:a16="http://schemas.microsoft.com/office/drawing/2014/main" id="{ADE125D3-A013-4E71-B0A9-0B9A7DABB9A1}"/>
               </a:ext>
             </a:extLst>
           </p:cNvPr>
@@ -2724,7 +3396,7 @@
           <p:cNvPr id="2" name="Title 1">
             <a:extLst>
               <a:ext uri="{FF2B5EF4-FFF2-40B4-BE49-F238E27FC236}">
-                <a16:creationId xmlns:a16="http://schemas.microsoft.com/office/drawing/2014/main" xmlns="" id="{00229BCF-5C28-4254-8DB7-7A45AD854E39}"/>
+                <a16:creationId xmlns:a16="http://schemas.microsoft.com/office/drawing/2014/main" id="{00229BCF-5C28-4254-8DB7-7A45AD854E39}"/>
               </a:ext>
             </a:extLst>
           </p:cNvPr>
@@ -2761,7 +3433,7 @@
           <p:cNvPr id="3" name="Picture Placeholder 2">
             <a:extLst>
               <a:ext uri="{FF2B5EF4-FFF2-40B4-BE49-F238E27FC236}">
-                <a16:creationId xmlns:a16="http://schemas.microsoft.com/office/drawing/2014/main" xmlns="" id="{B7D9DD18-4E73-4BED-AFF6-DB696C9FBAFC}"/>
+                <a16:creationId xmlns:a16="http://schemas.microsoft.com/office/drawing/2014/main" id="{B7D9DD18-4E73-4BED-AFF6-DB696C9FBAFC}"/>
               </a:ext>
             </a:extLst>
           </p:cNvPr>
@@ -2831,7 +3503,7 @@
           <p:cNvPr id="4" name="Text Placeholder 3">
             <a:extLst>
               <a:ext uri="{FF2B5EF4-FFF2-40B4-BE49-F238E27FC236}">
-                <a16:creationId xmlns:a16="http://schemas.microsoft.com/office/drawing/2014/main" xmlns="" id="{1151A2F4-CCCB-4B65-8F5A-12C342859484}"/>
+                <a16:creationId xmlns:a16="http://schemas.microsoft.com/office/drawing/2014/main" id="{1151A2F4-CCCB-4B65-8F5A-12C342859484}"/>
               </a:ext>
             </a:extLst>
           </p:cNvPr>
@@ -2902,7 +3574,7 @@
           <p:cNvPr id="5" name="Date Placeholder 4">
             <a:extLst>
               <a:ext uri="{FF2B5EF4-FFF2-40B4-BE49-F238E27FC236}">
-                <a16:creationId xmlns:a16="http://schemas.microsoft.com/office/drawing/2014/main" xmlns="" id="{DC7E8FD5-7E85-4234-937A-4AE74381357D}"/>
+                <a16:creationId xmlns:a16="http://schemas.microsoft.com/office/drawing/2014/main" id="{DC7E8FD5-7E85-4234-937A-4AE74381357D}"/>
               </a:ext>
             </a:extLst>
           </p:cNvPr>
@@ -2928,7 +3600,7 @@
           <a:p>
             <a:fld id="{AE5DB8C5-1F04-44FE-B5DC-B4D028B34EAC}" type="datetimeFigureOut">
               <a:rPr lang="en-US" smtClean="0"/>
-              <a:t>1/22/2019</a:t>
+              <a:t>1/23/2019</a:t>
             </a:fld>
             <a:endParaRPr lang="en-US"/>
           </a:p>
@@ -2939,7 +3611,7 @@
           <p:cNvPr id="6" name="Footer Placeholder 5">
             <a:extLst>
               <a:ext uri="{FF2B5EF4-FFF2-40B4-BE49-F238E27FC236}">
-                <a16:creationId xmlns:a16="http://schemas.microsoft.com/office/drawing/2014/main" xmlns="" id="{CD902B1C-7154-4939-901F-4D085997B7A7}"/>
+                <a16:creationId xmlns:a16="http://schemas.microsoft.com/office/drawing/2014/main" id="{CD902B1C-7154-4939-901F-4D085997B7A7}"/>
               </a:ext>
             </a:extLst>
           </p:cNvPr>
@@ -2972,7 +3644,7 @@
           <p:cNvPr id="7" name="Slide Number Placeholder 6">
             <a:extLst>
               <a:ext uri="{FF2B5EF4-FFF2-40B4-BE49-F238E27FC236}">
-                <a16:creationId xmlns:a16="http://schemas.microsoft.com/office/drawing/2014/main" xmlns="" id="{670A694C-D6FD-4E00-AD7C-489C8D91A962}"/>
+                <a16:creationId xmlns:a16="http://schemas.microsoft.com/office/drawing/2014/main" id="{670A694C-D6FD-4E00-AD7C-489C8D91A962}"/>
               </a:ext>
             </a:extLst>
           </p:cNvPr>
@@ -3044,7 +3716,7 @@
           <p:cNvPr id="14" name="Picture 13">
             <a:extLst>
               <a:ext uri="{FF2B5EF4-FFF2-40B4-BE49-F238E27FC236}">
-                <a16:creationId xmlns:a16="http://schemas.microsoft.com/office/drawing/2014/main" xmlns="" id="{ECD5D7F5-562B-42D3-885E-8C579833BD52}"/>
+                <a16:creationId xmlns:a16="http://schemas.microsoft.com/office/drawing/2014/main" id="{ECD5D7F5-562B-42D3-885E-8C579833BD52}"/>
               </a:ext>
             </a:extLst>
           </p:cNvPr>
@@ -3054,7 +3726,7 @@
           <p:nvPr userDrawn="1"/>
         </p:nvPicPr>
         <p:blipFill rotWithShape="1">
-          <a:blip r:embed="rId13" cstate="print">
+          <a:blip r:embed="rId14" cstate="print">
             <a:extLst>
               <a:ext uri="{28A0092B-C50C-407E-A947-70E740481C1C}">
                 <a14:useLocalDpi xmlns:a14="http://schemas.microsoft.com/office/drawing/2010/main" val="0"/>
@@ -3079,7 +3751,7 @@
           <p:cNvPr id="2" name="Title Placeholder 1">
             <a:extLst>
               <a:ext uri="{FF2B5EF4-FFF2-40B4-BE49-F238E27FC236}">
-                <a16:creationId xmlns:a16="http://schemas.microsoft.com/office/drawing/2014/main" xmlns="" id="{78A9B363-9618-4ACB-8C04-E8FB2460BF53}"/>
+                <a16:creationId xmlns:a16="http://schemas.microsoft.com/office/drawing/2014/main" id="{78A9B363-9618-4ACB-8C04-E8FB2460BF53}"/>
               </a:ext>
             </a:extLst>
           </p:cNvPr>
@@ -3117,7 +3789,7 @@
           <p:cNvPr id="3" name="Text Placeholder 2">
             <a:extLst>
               <a:ext uri="{FF2B5EF4-FFF2-40B4-BE49-F238E27FC236}">
-                <a16:creationId xmlns:a16="http://schemas.microsoft.com/office/drawing/2014/main" xmlns="" id="{6FD32510-E31C-4FFD-8956-5D8A0097FEFB}"/>
+                <a16:creationId xmlns:a16="http://schemas.microsoft.com/office/drawing/2014/main" id="{6FD32510-E31C-4FFD-8956-5D8A0097FEFB}"/>
               </a:ext>
             </a:extLst>
           </p:cNvPr>
@@ -3184,7 +3856,7 @@
           <p:cNvPr id="9" name="Rectangle 8">
             <a:extLst>
               <a:ext uri="{FF2B5EF4-FFF2-40B4-BE49-F238E27FC236}">
-                <a16:creationId xmlns:a16="http://schemas.microsoft.com/office/drawing/2014/main" xmlns="" id="{B11B0355-FBC1-467A-91E3-ED4B84152397}"/>
+                <a16:creationId xmlns:a16="http://schemas.microsoft.com/office/drawing/2014/main" id="{B11B0355-FBC1-467A-91E3-ED4B84152397}"/>
               </a:ext>
             </a:extLst>
           </p:cNvPr>
@@ -3236,7 +3908,7 @@
           <p:cNvPr id="10" name="Rectangle 9">
             <a:extLst>
               <a:ext uri="{FF2B5EF4-FFF2-40B4-BE49-F238E27FC236}">
-                <a16:creationId xmlns:a16="http://schemas.microsoft.com/office/drawing/2014/main" xmlns="" id="{B223D8C5-92EF-49CA-A0BA-8BFA142E4B9F}"/>
+                <a16:creationId xmlns:a16="http://schemas.microsoft.com/office/drawing/2014/main" id="{B223D8C5-92EF-49CA-A0BA-8BFA142E4B9F}"/>
               </a:ext>
             </a:extLst>
           </p:cNvPr>
@@ -3288,7 +3960,7 @@
           <p:cNvPr id="8" name="Picture 7">
             <a:extLst>
               <a:ext uri="{FF2B5EF4-FFF2-40B4-BE49-F238E27FC236}">
-                <a16:creationId xmlns:a16="http://schemas.microsoft.com/office/drawing/2014/main" xmlns="" id="{35C10E35-CC2A-4772-A087-CE039A41659A}"/>
+                <a16:creationId xmlns:a16="http://schemas.microsoft.com/office/drawing/2014/main" id="{35C10E35-CC2A-4772-A087-CE039A41659A}"/>
               </a:ext>
             </a:extLst>
           </p:cNvPr>
@@ -3298,7 +3970,7 @@
           <p:nvPr userDrawn="1"/>
         </p:nvPicPr>
         <p:blipFill>
-          <a:blip r:embed="rId14" cstate="print">
+          <a:blip r:embed="rId15" cstate="print">
             <a:extLst>
               <a:ext uri="{28A0092B-C50C-407E-A947-70E740481C1C}">
                 <a14:useLocalDpi xmlns:a14="http://schemas.microsoft.com/office/drawing/2010/main" val="0"/>
@@ -3324,7 +3996,7 @@
           <p:cNvPr id="11" name="Rectangle 10">
             <a:extLst>
               <a:ext uri="{FF2B5EF4-FFF2-40B4-BE49-F238E27FC236}">
-                <a16:creationId xmlns:a16="http://schemas.microsoft.com/office/drawing/2014/main" xmlns="" id="{755E8507-269D-4829-A125-44E0FC450222}"/>
+                <a16:creationId xmlns:a16="http://schemas.microsoft.com/office/drawing/2014/main" id="{755E8507-269D-4829-A125-44E0FC450222}"/>
               </a:ext>
             </a:extLst>
           </p:cNvPr>
@@ -3376,7 +4048,7 @@
           <p:cNvPr id="12" name="Rectangle 11">
             <a:extLst>
               <a:ext uri="{FF2B5EF4-FFF2-40B4-BE49-F238E27FC236}">
-                <a16:creationId xmlns:a16="http://schemas.microsoft.com/office/drawing/2014/main" xmlns="" id="{E9B39EB9-3CB9-4F16-8413-E8A10EA21E70}"/>
+                <a16:creationId xmlns:a16="http://schemas.microsoft.com/office/drawing/2014/main" id="{E9B39EB9-3CB9-4F16-8413-E8A10EA21E70}"/>
               </a:ext>
             </a:extLst>
           </p:cNvPr>
@@ -3443,6 +4115,7 @@
     <p:sldLayoutId id="2147483657" r:id="rId9"/>
     <p:sldLayoutId id="2147483658" r:id="rId10"/>
     <p:sldLayoutId id="2147483659" r:id="rId11"/>
+    <p:sldLayoutId id="2147483660" r:id="rId12"/>
   </p:sldLayoutIdLst>
   <p:txStyles>
     <p:titleStyle>
@@ -3749,7 +4422,7 @@
           <p:cNvPr id="7" name="Picture 6">
             <a:extLst>
               <a:ext uri="{FF2B5EF4-FFF2-40B4-BE49-F238E27FC236}">
-                <a16:creationId xmlns:a16="http://schemas.microsoft.com/office/drawing/2014/main" xmlns="" id="{9A432DC3-3D32-4E39-9733-B97A9C560D90}"/>
+                <a16:creationId xmlns:a16="http://schemas.microsoft.com/office/drawing/2014/main" id="{9A432DC3-3D32-4E39-9733-B97A9C560D90}"/>
               </a:ext>
             </a:extLst>
           </p:cNvPr>
@@ -3785,7 +4458,7 @@
           <p:cNvPr id="8" name="TextBox 7">
             <a:extLst>
               <a:ext uri="{FF2B5EF4-FFF2-40B4-BE49-F238E27FC236}">
-                <a16:creationId xmlns:a16="http://schemas.microsoft.com/office/drawing/2014/main" xmlns="" id="{B5054634-0899-41A2-BA31-A1130359587E}"/>
+                <a16:creationId xmlns:a16="http://schemas.microsoft.com/office/drawing/2014/main" id="{B5054634-0899-41A2-BA31-A1130359587E}"/>
               </a:ext>
             </a:extLst>
           </p:cNvPr>
@@ -3859,7 +4532,7 @@
           <p:cNvPr id="2" name="Title 1">
             <a:extLst>
               <a:ext uri="{FF2B5EF4-FFF2-40B4-BE49-F238E27FC236}">
-                <a16:creationId xmlns:a16="http://schemas.microsoft.com/office/drawing/2014/main" xmlns="" id="{A9C5F62D-A3F5-4E18-ADB9-1A8BD4D0B809}"/>
+                <a16:creationId xmlns:a16="http://schemas.microsoft.com/office/drawing/2014/main" id="{A9C5F62D-A3F5-4E18-ADB9-1A8BD4D0B809}"/>
               </a:ext>
             </a:extLst>
           </p:cNvPr>
@@ -3888,7 +4561,7 @@
           <p:cNvPr id="5" name="Content Placeholder 4">
             <a:extLst>
               <a:ext uri="{FF2B5EF4-FFF2-40B4-BE49-F238E27FC236}">
-                <a16:creationId xmlns:a16="http://schemas.microsoft.com/office/drawing/2014/main" xmlns="" id="{2F94EF9E-73CE-49F7-96C9-D72EE6EDD26B}"/>
+                <a16:creationId xmlns:a16="http://schemas.microsoft.com/office/drawing/2014/main" id="{2F94EF9E-73CE-49F7-96C9-D72EE6EDD26B}"/>
               </a:ext>
             </a:extLst>
           </p:cNvPr>
@@ -3961,7 +4634,7 @@
           <p:cNvPr id="2" name="Title 1">
             <a:extLst>
               <a:ext uri="{FF2B5EF4-FFF2-40B4-BE49-F238E27FC236}">
-                <a16:creationId xmlns:a16="http://schemas.microsoft.com/office/drawing/2014/main" xmlns="" id="{32CBE7AC-7173-446A-8D70-7C6C6ADBB5F4}"/>
+                <a16:creationId xmlns:a16="http://schemas.microsoft.com/office/drawing/2014/main" id="{32CBE7AC-7173-446A-8D70-7C6C6ADBB5F4}"/>
               </a:ext>
             </a:extLst>
           </p:cNvPr>
@@ -3990,7 +4663,7 @@
           <p:cNvPr id="5" name="Content Placeholder 4">
             <a:extLst>
               <a:ext uri="{FF2B5EF4-FFF2-40B4-BE49-F238E27FC236}">
-                <a16:creationId xmlns:a16="http://schemas.microsoft.com/office/drawing/2014/main" xmlns="" id="{858C2DFF-E7B2-4225-A156-B94F36A856CF}"/>
+                <a16:creationId xmlns:a16="http://schemas.microsoft.com/office/drawing/2014/main" id="{858C2DFF-E7B2-4225-A156-B94F36A856CF}"/>
               </a:ext>
             </a:extLst>
           </p:cNvPr>
@@ -4063,7 +4736,7 @@
           <p:cNvPr id="2" name="Title 1">
             <a:extLst>
               <a:ext uri="{FF2B5EF4-FFF2-40B4-BE49-F238E27FC236}">
-                <a16:creationId xmlns:a16="http://schemas.microsoft.com/office/drawing/2014/main" xmlns="" id="{995395D3-4F7B-4DA8-ADD2-5C633ADBCB3D}"/>
+                <a16:creationId xmlns:a16="http://schemas.microsoft.com/office/drawing/2014/main" id="{995395D3-4F7B-4DA8-ADD2-5C633ADBCB3D}"/>
               </a:ext>
             </a:extLst>
           </p:cNvPr>
@@ -4092,7 +4765,7 @@
           <p:cNvPr id="7" name="Content Placeholder 6">
             <a:extLst>
               <a:ext uri="{FF2B5EF4-FFF2-40B4-BE49-F238E27FC236}">
-                <a16:creationId xmlns:a16="http://schemas.microsoft.com/office/drawing/2014/main" xmlns="" id="{C281A676-2F51-442D-9AD5-3BA81F618759}"/>
+                <a16:creationId xmlns:a16="http://schemas.microsoft.com/office/drawing/2014/main" id="{C281A676-2F51-442D-9AD5-3BA81F618759}"/>
               </a:ext>
             </a:extLst>
           </p:cNvPr>
@@ -4110,7 +4783,7 @@
                 <a14:useLocalDpi xmlns:a14="http://schemas.microsoft.com/office/drawing/2010/main" val="0"/>
               </a:ext>
               <a:ext uri="{96DAC541-7B7A-43D3-8B79-37D633B846F1}">
-                <asvg:svgBlip xmlns:asvg="http://schemas.microsoft.com/office/drawing/2016/SVG/main" xmlns="" r:embed="rId3"/>
+                <asvg:svgBlip xmlns:asvg="http://schemas.microsoft.com/office/drawing/2016/SVG/main" r:embed="rId3"/>
               </a:ext>
             </a:extLst>
           </a:blip>
@@ -4130,7 +4803,7 @@
           <p:cNvPr id="9" name="Picture 8">
             <a:extLst>
               <a:ext uri="{FF2B5EF4-FFF2-40B4-BE49-F238E27FC236}">
-                <a16:creationId xmlns:a16="http://schemas.microsoft.com/office/drawing/2014/main" xmlns="" id="{FA36149C-140B-4A58-9BF3-186A637CB6E4}"/>
+                <a16:creationId xmlns:a16="http://schemas.microsoft.com/office/drawing/2014/main" id="{FA36149C-140B-4A58-9BF3-186A637CB6E4}"/>
               </a:ext>
             </a:extLst>
           </p:cNvPr>
@@ -4166,7 +4839,7 @@
           <p:cNvPr id="10" name="TextBox 9">
             <a:extLst>
               <a:ext uri="{FF2B5EF4-FFF2-40B4-BE49-F238E27FC236}">
-                <a16:creationId xmlns:a16="http://schemas.microsoft.com/office/drawing/2014/main" xmlns="" id="{E659AB9E-41B9-4B2F-A378-03A0C0E4A54F}"/>
+                <a16:creationId xmlns:a16="http://schemas.microsoft.com/office/drawing/2014/main" id="{E659AB9E-41B9-4B2F-A378-03A0C0E4A54F}"/>
               </a:ext>
             </a:extLst>
           </p:cNvPr>
@@ -4236,10 +4909,10 @@
       </p:grpSpPr>
       <p:sp>
         <p:nvSpPr>
-          <p:cNvPr id="2" name="Title 1">
-            <a:extLst>
-              <a:ext uri="{FF2B5EF4-FFF2-40B4-BE49-F238E27FC236}">
-                <a16:creationId xmlns:a16="http://schemas.microsoft.com/office/drawing/2014/main" xmlns="" id="{993D9999-0877-4B24-883F-9BA46046EF60}"/>
+          <p:cNvPr id="4" name="Title 3">
+            <a:extLst>
+              <a:ext uri="{FF2B5EF4-FFF2-40B4-BE49-F238E27FC236}">
+                <a16:creationId xmlns:a16="http://schemas.microsoft.com/office/drawing/2014/main" id="{EC923F91-A15C-1845-825F-BB8CE98DDA31}"/>
               </a:ext>
             </a:extLst>
           </p:cNvPr>
@@ -4250,102 +4923,222 @@
             <p:ph type="title"/>
           </p:nvPr>
         </p:nvSpPr>
-        <p:spPr/>
-        <p:txBody>
-          <a:bodyPr/>
-          <a:lstStyle/>
-          <a:p>
-            <a:pPr algn="ctr"/>
-            <a:r>
-              <a:rPr lang="en-US" b="1" smtClean="0"/>
-              <a:t>VueConf.US 2019</a:t>
-            </a:r>
-            <a:endParaRPr lang="en-US" b="1" dirty="0"/>
-          </a:p>
-        </p:txBody>
-      </p:sp>
-      <p:sp>
-        <p:nvSpPr>
-          <p:cNvPr id="5" name="Content Placeholder 4">
-            <a:extLst>
-              <a:ext uri="{FF2B5EF4-FFF2-40B4-BE49-F238E27FC236}">
-                <a16:creationId xmlns:a16="http://schemas.microsoft.com/office/drawing/2014/main" xmlns="" id="{2FAC6001-E38D-4664-86A1-BE2B5BF6BE52}"/>
-              </a:ext>
-            </a:extLst>
-          </p:cNvPr>
-          <p:cNvSpPr>
-            <a:spLocks noGrp="1"/>
-          </p:cNvSpPr>
-          <p:nvPr>
-            <p:ph idx="1"/>
-          </p:nvPr>
-        </p:nvSpPr>
-        <p:spPr/>
+        <p:spPr>
+          <a:xfrm>
+            <a:off x="621807" y="5294690"/>
+            <a:ext cx="10948387" cy="720000"/>
+          </a:xfrm>
+        </p:spPr>
         <p:txBody>
           <a:bodyPr>
             <a:normAutofit/>
           </a:bodyPr>
           <a:lstStyle/>
           <a:p>
-            <a:r>
-              <a:rPr lang="en-US" dirty="0" smtClean="0"/>
-              <a:t>$50 off Main Conference</a:t>
-            </a:r>
-          </a:p>
-          <a:p>
-            <a:pPr lvl="1"/>
-            <a:r>
-              <a:rPr lang="en-US" dirty="0" smtClean="0"/>
-              <a:t>VUECONFMTUP50</a:t>
-            </a:r>
-          </a:p>
-          <a:p>
-            <a:pPr marL="457200" lvl="1" indent="0">
-              <a:buNone/>
+            <a:pPr algn="ctr"/>
+            <a:r>
+              <a:rPr lang="en-US" sz="3200" b="0" dirty="0"/>
+              <a:t>Helping Developers Be Successful</a:t>
+            </a:r>
+          </a:p>
+        </p:txBody>
+      </p:sp>
+      <p:cxnSp>
+        <p:nvCxnSpPr>
+          <p:cNvPr id="11" name="Straight Connector 10">
+            <a:extLst>
+              <a:ext uri="{FF2B5EF4-FFF2-40B4-BE49-F238E27FC236}">
+                <a16:creationId xmlns:a16="http://schemas.microsoft.com/office/drawing/2014/main" id="{AEA695EE-564E-A448-BAFB-3FECBA0171DE}"/>
+              </a:ext>
+            </a:extLst>
+          </p:cNvPr>
+          <p:cNvCxnSpPr>
+            <a:cxnSpLocks/>
+          </p:cNvCxnSpPr>
+          <p:nvPr/>
+        </p:nvCxnSpPr>
+        <p:spPr>
+          <a:xfrm>
+            <a:off x="4196449" y="1705437"/>
+            <a:ext cx="0" cy="3378868"/>
+          </a:xfrm>
+          <a:prstGeom prst="line">
+            <a:avLst/>
+          </a:prstGeom>
+          <a:ln w="12700">
+            <a:solidFill>
+              <a:schemeClr val="tx1"/>
+            </a:solidFill>
+          </a:ln>
+        </p:spPr>
+        <p:style>
+          <a:lnRef idx="1">
+            <a:schemeClr val="accent1"/>
+          </a:lnRef>
+          <a:fillRef idx="0">
+            <a:schemeClr val="accent1"/>
+          </a:fillRef>
+          <a:effectRef idx="0">
+            <a:schemeClr val="accent1"/>
+          </a:effectRef>
+          <a:fontRef idx="minor">
+            <a:schemeClr val="tx1"/>
+          </a:fontRef>
+        </p:style>
+      </p:cxnSp>
+      <p:cxnSp>
+        <p:nvCxnSpPr>
+          <p:cNvPr id="13" name="Straight Connector 12">
+            <a:extLst>
+              <a:ext uri="{FF2B5EF4-FFF2-40B4-BE49-F238E27FC236}">
+                <a16:creationId xmlns:a16="http://schemas.microsoft.com/office/drawing/2014/main" id="{7E66B7A3-8E6B-AA4B-B72E-CA3BFBCA34B3}"/>
+              </a:ext>
+            </a:extLst>
+          </p:cNvPr>
+          <p:cNvCxnSpPr>
+            <a:cxnSpLocks/>
+          </p:cNvCxnSpPr>
+          <p:nvPr/>
+        </p:nvCxnSpPr>
+        <p:spPr>
+          <a:xfrm>
+            <a:off x="8549611" y="1705437"/>
+            <a:ext cx="0" cy="3378868"/>
+          </a:xfrm>
+          <a:prstGeom prst="line">
+            <a:avLst/>
+          </a:prstGeom>
+          <a:ln w="12700">
+            <a:solidFill>
+              <a:schemeClr val="tx1"/>
+            </a:solidFill>
+          </a:ln>
+        </p:spPr>
+        <p:style>
+          <a:lnRef idx="1">
+            <a:schemeClr val="accent1"/>
+          </a:lnRef>
+          <a:fillRef idx="0">
+            <a:schemeClr val="accent1"/>
+          </a:fillRef>
+          <a:effectRef idx="0">
+            <a:schemeClr val="accent1"/>
+          </a:effectRef>
+          <a:fontRef idx="minor">
+            <a:schemeClr val="tx1"/>
+          </a:fontRef>
+        </p:style>
+      </p:cxnSp>
+      <p:sp>
+        <p:nvSpPr>
+          <p:cNvPr id="25" name="TextBox 24">
+            <a:extLst>
+              <a:ext uri="{FF2B5EF4-FFF2-40B4-BE49-F238E27FC236}">
+                <a16:creationId xmlns:a16="http://schemas.microsoft.com/office/drawing/2014/main" id="{367EA930-DBA3-5248-8494-B4B4C5B36D8A}"/>
+              </a:ext>
+            </a:extLst>
+          </p:cNvPr>
+          <p:cNvSpPr txBox="1"/>
+          <p:nvPr/>
+        </p:nvSpPr>
+        <p:spPr bwMode="auto">
+          <a:xfrm>
+            <a:off x="122492" y="3653144"/>
+            <a:ext cx="4044028" cy="1000274"/>
+          </a:xfrm>
+          <a:prstGeom prst="rect">
+            <a:avLst/>
+          </a:prstGeom>
+          <a:noFill/>
+          <a:ln w="9525">
+            <a:noFill/>
+            <a:miter lim="800000"/>
+            <a:headEnd/>
+            <a:tailEnd/>
+          </a:ln>
+        </p:spPr>
+        <p:txBody>
+          <a:bodyPr vert="horz" wrap="square" lIns="91440" tIns="45720" rIns="91440" bIns="45720" numCol="1" rtlCol="0" anchor="t" anchorCtr="0" compatLnSpc="1">
+            <a:prstTxWarp prst="textNoShape">
+              <a:avLst/>
+            </a:prstTxWarp>
+            <a:spAutoFit/>
+          </a:bodyPr>
+          <a:lstStyle/>
+          <a:p>
+            <a:pPr algn="ctr">
+              <a:spcAft>
+                <a:spcPts val="600"/>
+              </a:spcAft>
+              <a:defRPr/>
             </a:pPr>
-            <a:endParaRPr lang="en-US" dirty="0" smtClean="0"/>
-          </a:p>
-          <a:p>
-            <a:r>
-              <a:rPr lang="en-US" dirty="0" smtClean="0"/>
-              <a:t>$100 off Main Conference + Workshop	</a:t>
-            </a:r>
-          </a:p>
-          <a:p>
-            <a:pPr lvl="1"/>
-            <a:r>
-              <a:rPr lang="en-US" dirty="0" smtClean="0"/>
-              <a:t>VUECONFMTUP-WORKSHOP100</a:t>
-            </a:r>
-          </a:p>
-          <a:p>
-            <a:pPr marL="457200" lvl="1" indent="0">
-              <a:buNone/>
+            <a:r>
+              <a:rPr lang="en-US" dirty="0">
+                <a:solidFill>
+                  <a:srgbClr val="00A4A5"/>
+                </a:solidFill>
+                <a:cs typeface="Arial"/>
+              </a:rPr>
+              <a:t>Modern UI Made Easy</a:t>
+            </a:r>
+          </a:p>
+          <a:p>
+            <a:pPr algn="ctr">
+              <a:defRPr/>
             </a:pPr>
-            <a:endParaRPr lang="en-US" dirty="0"/>
-          </a:p>
-          <a:p>
-            <a:r>
-              <a:rPr lang="en-US" dirty="0" smtClean="0"/>
-              <a:t>THREE WEEKS TO USE!</a:t>
-            </a:r>
-            <a:endParaRPr lang="en-US" dirty="0"/>
+            <a:r>
+              <a:rPr lang="en-US" dirty="0">
+                <a:solidFill>
+                  <a:srgbClr val="55D400"/>
+                </a:solidFill>
+              </a:rPr>
+              <a:t>Powering millions of .NET</a:t>
+            </a:r>
+            <a:r>
+              <a:rPr lang="en-US" dirty="0">
+                <a:solidFill>
+                  <a:srgbClr val="55D400"/>
+                </a:solidFill>
+                <a:cs typeface="Arial"/>
+              </a:rPr>
+              <a:t>, </a:t>
+            </a:r>
+          </a:p>
+          <a:p>
+            <a:pPr algn="ctr">
+              <a:defRPr/>
+            </a:pPr>
+            <a:r>
+              <a:rPr lang="en-US" dirty="0">
+                <a:solidFill>
+                  <a:srgbClr val="55D400"/>
+                </a:solidFill>
+                <a:cs typeface="Arial"/>
+              </a:rPr>
+              <a:t>JavaScript &amp; Chatbot Apps</a:t>
+            </a:r>
           </a:p>
         </p:txBody>
       </p:sp>
       <p:pic>
         <p:nvPicPr>
-          <p:cNvPr id="3" name="Picture 2"/>
+          <p:cNvPr id="26" name="Picture 25">
+            <a:extLst>
+              <a:ext uri="{FF2B5EF4-FFF2-40B4-BE49-F238E27FC236}">
+                <a16:creationId xmlns:a16="http://schemas.microsoft.com/office/drawing/2014/main" id="{E4975C70-F339-6049-850F-A16518D8D5CD}"/>
+              </a:ext>
+            </a:extLst>
+          </p:cNvPr>
           <p:cNvPicPr>
             <a:picLocks noChangeAspect="1"/>
           </p:cNvPicPr>
           <p:nvPr/>
         </p:nvPicPr>
         <p:blipFill>
-          <a:blip r:embed="rId2">
+          <a:blip r:embed="rId2" cstate="screen">
             <a:extLst>
               <a:ext uri="{28A0092B-C50C-407E-A947-70E740481C1C}">
-                <a14:useLocalDpi xmlns:a14="http://schemas.microsoft.com/office/drawing/2010/main" val="0"/>
+                <a14:useLocalDpi xmlns:a14="http://schemas.microsoft.com/office/drawing/2010/main"/>
               </a:ext>
             </a:extLst>
           </a:blip>
@@ -4355,32 +5148,1016 @@
         </p:blipFill>
         <p:spPr>
           <a:xfrm>
-            <a:off x="7875840" y="2368799"/>
-            <a:ext cx="3477960" cy="3471126"/>
+            <a:off x="1589647" y="1705438"/>
+            <a:ext cx="1349099" cy="1583725"/>
           </a:xfrm>
           <a:prstGeom prst="rect">
             <a:avLst/>
           </a:prstGeom>
         </p:spPr>
       </p:pic>
+      <p:pic>
+        <p:nvPicPr>
+          <p:cNvPr id="27" name="Picture 26">
+            <a:extLst>
+              <a:ext uri="{FF2B5EF4-FFF2-40B4-BE49-F238E27FC236}">
+                <a16:creationId xmlns:a16="http://schemas.microsoft.com/office/drawing/2014/main" id="{001F0494-AF31-264E-9B73-72F2611267CA}"/>
+              </a:ext>
+            </a:extLst>
+          </p:cNvPr>
+          <p:cNvPicPr>
+            <a:picLocks noChangeAspect="1"/>
+          </p:cNvPicPr>
+          <p:nvPr/>
+        </p:nvPicPr>
+        <p:blipFill>
+          <a:blip r:embed="rId3" cstate="screen">
+            <a:extLst>
+              <a:ext uri="{28A0092B-C50C-407E-A947-70E740481C1C}">
+                <a14:useLocalDpi xmlns:a14="http://schemas.microsoft.com/office/drawing/2010/main"/>
+              </a:ext>
+            </a:extLst>
+          </a:blip>
+          <a:stretch>
+            <a:fillRect/>
+          </a:stretch>
+        </p:blipFill>
+        <p:spPr>
+          <a:xfrm>
+            <a:off x="558739" y="3090018"/>
+            <a:ext cx="3084082" cy="469149"/>
+          </a:xfrm>
+          <a:prstGeom prst="rect">
+            <a:avLst/>
+          </a:prstGeom>
+        </p:spPr>
+      </p:pic>
+      <p:sp>
+        <p:nvSpPr>
+          <p:cNvPr id="29" name="TextBox 28">
+            <a:extLst>
+              <a:ext uri="{FF2B5EF4-FFF2-40B4-BE49-F238E27FC236}">
+                <a16:creationId xmlns:a16="http://schemas.microsoft.com/office/drawing/2014/main" id="{19D2AC33-7E1E-E344-B82B-4E6A74D40677}"/>
+              </a:ext>
+            </a:extLst>
+          </p:cNvPr>
+          <p:cNvSpPr txBox="1"/>
+          <p:nvPr/>
+        </p:nvSpPr>
+        <p:spPr bwMode="auto">
+          <a:xfrm>
+            <a:off x="4412468" y="3650455"/>
+            <a:ext cx="3973868" cy="736099"/>
+          </a:xfrm>
+          <a:prstGeom prst="rect">
+            <a:avLst/>
+          </a:prstGeom>
+          <a:noFill/>
+          <a:ln w="9525">
+            <a:noFill/>
+            <a:miter lim="800000"/>
+            <a:headEnd/>
+            <a:tailEnd/>
+          </a:ln>
+        </p:spPr>
+        <p:txBody>
+          <a:bodyPr vert="horz" wrap="square" lIns="91440" tIns="45720" rIns="91440" bIns="45720" numCol="1" rtlCol="0" anchor="t" anchorCtr="0" compatLnSpc="1">
+            <a:prstTxWarp prst="textNoShape">
+              <a:avLst/>
+            </a:prstTxWarp>
+            <a:spAutoFit/>
+          </a:bodyPr>
+          <a:lstStyle/>
+          <a:p>
+            <a:pPr algn="ctr">
+              <a:buSzTx/>
+              <a:defRPr/>
+            </a:pPr>
+            <a:r>
+              <a:rPr lang="en-US" dirty="0">
+                <a:solidFill>
+                  <a:srgbClr val="00A4A5"/>
+                </a:solidFill>
+              </a:rPr>
+              <a:t>Build Better</a:t>
+            </a:r>
+            <a:r>
+              <a:rPr lang="en-US" dirty="0">
+                <a:solidFill>
+                  <a:srgbClr val="00A4A5"/>
+                </a:solidFill>
+                <a:cs typeface="Arial"/>
+              </a:rPr>
+              <a:t> Web Apps Faster</a:t>
+            </a:r>
+            <a:endParaRPr lang="en-US" dirty="0"/>
+          </a:p>
+          <a:p>
+            <a:pPr algn="ctr" fontAlgn="base">
+              <a:spcBef>
+                <a:spcPts val="720"/>
+              </a:spcBef>
+              <a:spcAft>
+                <a:spcPct val="0"/>
+              </a:spcAft>
+              <a:defRPr/>
+            </a:pPr>
+            <a:r>
+              <a:rPr lang="en-US" dirty="0">
+                <a:solidFill>
+                  <a:srgbClr val="55D400"/>
+                </a:solidFill>
+                <a:latin typeface="Arial" charset="0"/>
+              </a:rPr>
+              <a:t>Bring Your Framework</a:t>
+            </a:r>
+          </a:p>
+        </p:txBody>
+      </p:sp>
+      <p:pic>
+        <p:nvPicPr>
+          <p:cNvPr id="30" name="Picture 29">
+            <a:extLst>
+              <a:ext uri="{FF2B5EF4-FFF2-40B4-BE49-F238E27FC236}">
+                <a16:creationId xmlns:a16="http://schemas.microsoft.com/office/drawing/2014/main" id="{F42FE992-165C-5A4E-BCB8-66A47341FE8B}"/>
+              </a:ext>
+            </a:extLst>
+          </p:cNvPr>
+          <p:cNvPicPr>
+            <a:picLocks noChangeAspect="1"/>
+          </p:cNvPicPr>
+          <p:nvPr/>
+        </p:nvPicPr>
+        <p:blipFill>
+          <a:blip r:embed="rId4" cstate="screen">
+            <a:extLst>
+              <a:ext uri="{28A0092B-C50C-407E-A947-70E740481C1C}">
+                <a14:useLocalDpi xmlns:a14="http://schemas.microsoft.com/office/drawing/2010/main"/>
+              </a:ext>
+            </a:extLst>
+          </a:blip>
+          <a:stretch>
+            <a:fillRect/>
+          </a:stretch>
+        </p:blipFill>
+        <p:spPr>
+          <a:xfrm>
+            <a:off x="5763398" y="3006454"/>
+            <a:ext cx="565416" cy="565416"/>
+          </a:xfrm>
+          <a:prstGeom prst="rect">
+            <a:avLst/>
+          </a:prstGeom>
+        </p:spPr>
+      </p:pic>
+      <p:pic>
+        <p:nvPicPr>
+          <p:cNvPr id="31" name="Picture 30">
+            <a:extLst>
+              <a:ext uri="{FF2B5EF4-FFF2-40B4-BE49-F238E27FC236}">
+                <a16:creationId xmlns:a16="http://schemas.microsoft.com/office/drawing/2014/main" id="{E1A54638-C63E-354F-9C34-F33EF88B3C8E}"/>
+              </a:ext>
+            </a:extLst>
+          </p:cNvPr>
+          <p:cNvPicPr>
+            <a:picLocks noChangeAspect="1"/>
+          </p:cNvPicPr>
+          <p:nvPr/>
+        </p:nvPicPr>
+        <p:blipFill>
+          <a:blip r:embed="rId5" cstate="screen">
+            <a:extLst>
+              <a:ext uri="{28A0092B-C50C-407E-A947-70E740481C1C}">
+                <a14:useLocalDpi xmlns:a14="http://schemas.microsoft.com/office/drawing/2010/main"/>
+              </a:ext>
+            </a:extLst>
+          </a:blip>
+          <a:stretch>
+            <a:fillRect/>
+          </a:stretch>
+        </p:blipFill>
+        <p:spPr>
+          <a:xfrm>
+            <a:off x="6462310" y="3071356"/>
+            <a:ext cx="493562" cy="493562"/>
+          </a:xfrm>
+          <a:prstGeom prst="rect">
+            <a:avLst/>
+          </a:prstGeom>
+        </p:spPr>
+      </p:pic>
+      <p:pic>
+        <p:nvPicPr>
+          <p:cNvPr id="32" name="Picture 31">
+            <a:extLst>
+              <a:ext uri="{FF2B5EF4-FFF2-40B4-BE49-F238E27FC236}">
+                <a16:creationId xmlns:a16="http://schemas.microsoft.com/office/drawing/2014/main" id="{2B75AD11-5531-114E-B6DE-F923A8C7330D}"/>
+              </a:ext>
+            </a:extLst>
+          </p:cNvPr>
+          <p:cNvPicPr>
+            <a:picLocks noChangeAspect="1"/>
+          </p:cNvPicPr>
+          <p:nvPr/>
+        </p:nvPicPr>
+        <p:blipFill>
+          <a:blip r:embed="rId6" cstate="screen">
+            <a:extLst>
+              <a:ext uri="{28A0092B-C50C-407E-A947-70E740481C1C}">
+                <a14:useLocalDpi xmlns:a14="http://schemas.microsoft.com/office/drawing/2010/main"/>
+              </a:ext>
+            </a:extLst>
+          </a:blip>
+          <a:stretch>
+            <a:fillRect/>
+          </a:stretch>
+        </p:blipFill>
+        <p:spPr>
+          <a:xfrm>
+            <a:off x="5134388" y="3071357"/>
+            <a:ext cx="489545" cy="489545"/>
+          </a:xfrm>
+          <a:prstGeom prst="rect">
+            <a:avLst/>
+          </a:prstGeom>
+        </p:spPr>
+      </p:pic>
+      <p:pic>
+        <p:nvPicPr>
+          <p:cNvPr id="33" name="Picture 32">
+            <a:extLst>
+              <a:ext uri="{FF2B5EF4-FFF2-40B4-BE49-F238E27FC236}">
+                <a16:creationId xmlns:a16="http://schemas.microsoft.com/office/drawing/2014/main" id="{4070F448-E20A-234A-98D8-B8B6916991FA}"/>
+              </a:ext>
+            </a:extLst>
+          </p:cNvPr>
+          <p:cNvPicPr>
+            <a:picLocks noChangeAspect="1"/>
+          </p:cNvPicPr>
+          <p:nvPr/>
+        </p:nvPicPr>
+        <p:blipFill>
+          <a:blip r:embed="rId7" cstate="screen">
+            <a:extLst>
+              <a:ext uri="{28A0092B-C50C-407E-A947-70E740481C1C}">
+                <a14:useLocalDpi xmlns:a14="http://schemas.microsoft.com/office/drawing/2010/main"/>
+              </a:ext>
+            </a:extLst>
+          </a:blip>
+          <a:stretch>
+            <a:fillRect/>
+          </a:stretch>
+        </p:blipFill>
+        <p:spPr>
+          <a:xfrm flipH="1">
+            <a:off x="7089369" y="3107330"/>
+            <a:ext cx="466691" cy="417596"/>
+          </a:xfrm>
+          <a:prstGeom prst="rect">
+            <a:avLst/>
+          </a:prstGeom>
+        </p:spPr>
+      </p:pic>
+      <p:pic>
+        <p:nvPicPr>
+          <p:cNvPr id="34" name="Picture 33">
+            <a:extLst>
+              <a:ext uri="{FF2B5EF4-FFF2-40B4-BE49-F238E27FC236}">
+                <a16:creationId xmlns:a16="http://schemas.microsoft.com/office/drawing/2014/main" id="{C9E22845-F255-AF44-824A-F2D9CCAD8256}"/>
+              </a:ext>
+            </a:extLst>
+          </p:cNvPr>
+          <p:cNvPicPr>
+            <a:picLocks noChangeAspect="1"/>
+          </p:cNvPicPr>
+          <p:nvPr/>
+        </p:nvPicPr>
+        <p:blipFill>
+          <a:blip r:embed="rId8">
+            <a:extLst>
+              <a:ext uri="{28A0092B-C50C-407E-A947-70E740481C1C}">
+                <a14:useLocalDpi xmlns:a14="http://schemas.microsoft.com/office/drawing/2010/main"/>
+              </a:ext>
+            </a:extLst>
+          </a:blip>
+          <a:stretch>
+            <a:fillRect/>
+          </a:stretch>
+        </p:blipFill>
+        <p:spPr>
+          <a:xfrm>
+            <a:off x="5102399" y="1965890"/>
+            <a:ext cx="2588162" cy="1026882"/>
+          </a:xfrm>
+          <a:prstGeom prst="rect">
+            <a:avLst/>
+          </a:prstGeom>
+        </p:spPr>
+      </p:pic>
+      <p:sp>
+        <p:nvSpPr>
+          <p:cNvPr id="36" name="TextBox 35">
+            <a:extLst>
+              <a:ext uri="{FF2B5EF4-FFF2-40B4-BE49-F238E27FC236}">
+                <a16:creationId xmlns:a16="http://schemas.microsoft.com/office/drawing/2014/main" id="{4357916D-50E3-DF41-9AF3-C41DE213C9C4}"/>
+              </a:ext>
+            </a:extLst>
+          </p:cNvPr>
+          <p:cNvSpPr txBox="1"/>
+          <p:nvPr/>
+        </p:nvSpPr>
+        <p:spPr bwMode="auto">
+          <a:xfrm>
+            <a:off x="8765630" y="3654099"/>
+            <a:ext cx="3120534" cy="736099"/>
+          </a:xfrm>
+          <a:prstGeom prst="rect">
+            <a:avLst/>
+          </a:prstGeom>
+          <a:noFill/>
+          <a:ln w="9525">
+            <a:noFill/>
+            <a:miter lim="800000"/>
+            <a:headEnd/>
+            <a:tailEnd/>
+          </a:ln>
+        </p:spPr>
+        <p:txBody>
+          <a:bodyPr vert="horz" wrap="none" lIns="91440" tIns="45720" rIns="91440" bIns="45720" numCol="1" rtlCol="0" anchor="t" anchorCtr="0" compatLnSpc="1">
+            <a:prstTxWarp prst="textNoShape">
+              <a:avLst/>
+            </a:prstTxWarp>
+            <a:spAutoFit/>
+          </a:bodyPr>
+          <a:lstStyle/>
+          <a:p>
+            <a:pPr algn="ctr" fontAlgn="base">
+              <a:spcBef>
+                <a:spcPts val="720"/>
+              </a:spcBef>
+              <a:spcAft>
+                <a:spcPct val="0"/>
+              </a:spcAft>
+              <a:defRPr/>
+            </a:pPr>
+            <a:r>
+              <a:rPr lang="en-US" dirty="0">
+                <a:solidFill>
+                  <a:srgbClr val="00A4A5"/>
+                </a:solidFill>
+                <a:latin typeface="Arial" charset="0"/>
+              </a:rPr>
+              <a:t>Native Mobile Apps with JS</a:t>
+            </a:r>
+          </a:p>
+          <a:p>
+            <a:pPr algn="ctr" fontAlgn="base">
+              <a:spcBef>
+                <a:spcPts val="720"/>
+              </a:spcBef>
+              <a:spcAft>
+                <a:spcPct val="0"/>
+              </a:spcAft>
+              <a:defRPr/>
+            </a:pPr>
+            <a:r>
+              <a:rPr lang="en-US" dirty="0">
+                <a:solidFill>
+                  <a:srgbClr val="55D400"/>
+                </a:solidFill>
+                <a:latin typeface="Arial" charset="0"/>
+              </a:rPr>
+              <a:t>OSS </a:t>
+            </a:r>
+            <a:r>
+              <a:rPr lang="en-US" dirty="0">
+                <a:latin typeface="Arial" charset="0"/>
+              </a:rPr>
+              <a:t>| </a:t>
+            </a:r>
+            <a:r>
+              <a:rPr lang="en-US" dirty="0">
+                <a:solidFill>
+                  <a:srgbClr val="55D400"/>
+                </a:solidFill>
+              </a:rPr>
+              <a:t>X</a:t>
+            </a:r>
+            <a:r>
+              <a:rPr lang="en-US" dirty="0">
+                <a:solidFill>
+                  <a:srgbClr val="55D400"/>
+                </a:solidFill>
+                <a:latin typeface="Arial" charset="0"/>
+              </a:rPr>
+              <a:t>-Platform </a:t>
+            </a:r>
+            <a:r>
+              <a:rPr lang="en-US" dirty="0">
+                <a:latin typeface="Arial" charset="0"/>
+              </a:rPr>
+              <a:t>|</a:t>
+            </a:r>
+            <a:r>
+              <a:rPr lang="en-US" dirty="0">
+                <a:solidFill>
+                  <a:srgbClr val="55D400"/>
+                </a:solidFill>
+                <a:latin typeface="Arial" charset="0"/>
+              </a:rPr>
+              <a:t> Any Tools</a:t>
+            </a:r>
+          </a:p>
+        </p:txBody>
+      </p:sp>
+      <p:pic>
+        <p:nvPicPr>
+          <p:cNvPr id="37" name="Picture 36">
+            <a:extLst>
+              <a:ext uri="{FF2B5EF4-FFF2-40B4-BE49-F238E27FC236}">
+                <a16:creationId xmlns:a16="http://schemas.microsoft.com/office/drawing/2014/main" id="{11013D1C-B1F6-8444-8B20-6984057586EA}"/>
+              </a:ext>
+            </a:extLst>
+          </p:cNvPr>
+          <p:cNvPicPr>
+            <a:picLocks noChangeAspect="1"/>
+          </p:cNvPicPr>
+          <p:nvPr/>
+        </p:nvPicPr>
+        <p:blipFill>
+          <a:blip r:embed="rId9"/>
+          <a:stretch>
+            <a:fillRect/>
+          </a:stretch>
+        </p:blipFill>
+        <p:spPr>
+          <a:xfrm>
+            <a:off x="9134788" y="3105826"/>
+            <a:ext cx="1308100" cy="419100"/>
+          </a:xfrm>
+          <a:prstGeom prst="rect">
+            <a:avLst/>
+          </a:prstGeom>
+        </p:spPr>
+      </p:pic>
+      <p:pic>
+        <p:nvPicPr>
+          <p:cNvPr id="38" name="Picture 37">
+            <a:extLst>
+              <a:ext uri="{FF2B5EF4-FFF2-40B4-BE49-F238E27FC236}">
+                <a16:creationId xmlns:a16="http://schemas.microsoft.com/office/drawing/2014/main" id="{733CB787-8137-EC4B-A438-77FD3B106C28}"/>
+              </a:ext>
+            </a:extLst>
+          </p:cNvPr>
+          <p:cNvPicPr>
+            <a:picLocks noChangeAspect="1"/>
+          </p:cNvPicPr>
+          <p:nvPr/>
+        </p:nvPicPr>
+        <p:blipFill>
+          <a:blip r:embed="rId10"/>
+          <a:stretch>
+            <a:fillRect/>
+          </a:stretch>
+        </p:blipFill>
+        <p:spPr>
+          <a:xfrm>
+            <a:off x="10477097" y="3118220"/>
+            <a:ext cx="419100" cy="419100"/>
+          </a:xfrm>
+          <a:prstGeom prst="rect">
+            <a:avLst/>
+          </a:prstGeom>
+        </p:spPr>
+      </p:pic>
+      <p:pic>
+        <p:nvPicPr>
+          <p:cNvPr id="39" name="Picture 38">
+            <a:extLst>
+              <a:ext uri="{FF2B5EF4-FFF2-40B4-BE49-F238E27FC236}">
+                <a16:creationId xmlns:a16="http://schemas.microsoft.com/office/drawing/2014/main" id="{5C65503B-06CF-C444-94BA-B22B132DC5F8}"/>
+              </a:ext>
+            </a:extLst>
+          </p:cNvPr>
+          <p:cNvPicPr>
+            <a:picLocks noChangeAspect="1"/>
+          </p:cNvPicPr>
+          <p:nvPr/>
+        </p:nvPicPr>
+        <p:blipFill>
+          <a:blip r:embed="rId11"/>
+          <a:stretch>
+            <a:fillRect/>
+          </a:stretch>
+        </p:blipFill>
+        <p:spPr>
+          <a:xfrm>
+            <a:off x="10936116" y="3126292"/>
+            <a:ext cx="419100" cy="419100"/>
+          </a:xfrm>
+          <a:prstGeom prst="rect">
+            <a:avLst/>
+          </a:prstGeom>
+        </p:spPr>
+      </p:pic>
+      <p:pic>
+        <p:nvPicPr>
+          <p:cNvPr id="40" name="Picture 39">
+            <a:extLst>
+              <a:ext uri="{FF2B5EF4-FFF2-40B4-BE49-F238E27FC236}">
+                <a16:creationId xmlns:a16="http://schemas.microsoft.com/office/drawing/2014/main" id="{C2D1072F-C065-9F45-B155-C160CCD1C9CD}"/>
+              </a:ext>
+            </a:extLst>
+          </p:cNvPr>
+          <p:cNvPicPr>
+            <a:picLocks noChangeAspect="1"/>
+          </p:cNvPicPr>
+          <p:nvPr/>
+        </p:nvPicPr>
+        <p:blipFill>
+          <a:blip r:embed="rId12" cstate="screen">
+            <a:extLst>
+              <a:ext uri="{28A0092B-C50C-407E-A947-70E740481C1C}">
+                <a14:useLocalDpi xmlns:a14="http://schemas.microsoft.com/office/drawing/2010/main"/>
+              </a:ext>
+            </a:extLst>
+          </a:blip>
+          <a:stretch>
+            <a:fillRect/>
+          </a:stretch>
+        </p:blipFill>
+        <p:spPr>
+          <a:xfrm>
+            <a:off x="9461553" y="1754482"/>
+            <a:ext cx="1735709" cy="1187001"/>
+          </a:xfrm>
+          <a:prstGeom prst="rect">
+            <a:avLst/>
+          </a:prstGeom>
+        </p:spPr>
+      </p:pic>
+      <p:pic>
+        <p:nvPicPr>
+          <p:cNvPr id="41" name="Picture 40">
+            <a:extLst>
+              <a:ext uri="{FF2B5EF4-FFF2-40B4-BE49-F238E27FC236}">
+                <a16:creationId xmlns:a16="http://schemas.microsoft.com/office/drawing/2014/main" id="{57D4229F-FAF9-174B-BFE2-3D9C64F1D5F1}"/>
+              </a:ext>
+            </a:extLst>
+          </p:cNvPr>
+          <p:cNvPicPr>
+            <a:picLocks noChangeAspect="1"/>
+          </p:cNvPicPr>
+          <p:nvPr/>
+        </p:nvPicPr>
+        <p:blipFill>
+          <a:blip r:embed="rId13">
+            <a:extLst>
+              <a:ext uri="{28A0092B-C50C-407E-A947-70E740481C1C}">
+                <a14:useLocalDpi xmlns:a14="http://schemas.microsoft.com/office/drawing/2010/main" val="0"/>
+              </a:ext>
+            </a:extLst>
+          </a:blip>
+          <a:stretch>
+            <a:fillRect/>
+          </a:stretch>
+        </p:blipFill>
+        <p:spPr>
+          <a:xfrm>
+            <a:off x="6632896" y="934278"/>
+            <a:ext cx="2148284" cy="500934"/>
+          </a:xfrm>
+          <a:prstGeom prst="rect">
+            <a:avLst/>
+          </a:prstGeom>
+        </p:spPr>
+      </p:pic>
+      <p:sp>
+        <p:nvSpPr>
+          <p:cNvPr id="35" name="TextBox 34">
+            <a:extLst>
+              <a:ext uri="{FF2B5EF4-FFF2-40B4-BE49-F238E27FC236}">
+                <a16:creationId xmlns:a16="http://schemas.microsoft.com/office/drawing/2014/main" id="{8487B414-DA29-094B-8DB7-B63E5E8EB293}"/>
+              </a:ext>
+            </a:extLst>
+          </p:cNvPr>
+          <p:cNvSpPr txBox="1"/>
+          <p:nvPr/>
+        </p:nvSpPr>
+        <p:spPr bwMode="auto">
+          <a:xfrm>
+            <a:off x="1298538" y="4718371"/>
+            <a:ext cx="1604484" cy="369332"/>
+          </a:xfrm>
+          <a:prstGeom prst="rect">
+            <a:avLst/>
+          </a:prstGeom>
+          <a:noFill/>
+          <a:ln w="9525">
+            <a:noFill/>
+            <a:miter lim="800000"/>
+            <a:headEnd/>
+            <a:tailEnd/>
+          </a:ln>
+        </p:spPr>
+        <p:txBody>
+          <a:bodyPr vert="horz" wrap="square" lIns="91440" tIns="45720" rIns="91440" bIns="45720" numCol="1" rtlCol="0" anchor="t" anchorCtr="0" compatLnSpc="1">
+            <a:prstTxWarp prst="textNoShape">
+              <a:avLst/>
+            </a:prstTxWarp>
+            <a:spAutoFit/>
+          </a:bodyPr>
+          <a:lstStyle/>
+          <a:p>
+            <a:pPr algn="ctr" fontAlgn="base">
+              <a:spcBef>
+                <a:spcPts val="720"/>
+              </a:spcBef>
+              <a:spcAft>
+                <a:spcPct val="0"/>
+              </a:spcAft>
+              <a:defRPr/>
+            </a:pPr>
+            <a:r>
+              <a:rPr lang="en-US" dirty="0">
+                <a:solidFill>
+                  <a:srgbClr val="E67300"/>
+                </a:solidFill>
+              </a:rPr>
+              <a:t>telerik.com</a:t>
+            </a:r>
+          </a:p>
+        </p:txBody>
+      </p:sp>
+      <p:sp>
+        <p:nvSpPr>
+          <p:cNvPr id="42" name="TextBox 41">
+            <a:extLst>
+              <a:ext uri="{FF2B5EF4-FFF2-40B4-BE49-F238E27FC236}">
+                <a16:creationId xmlns:a16="http://schemas.microsoft.com/office/drawing/2014/main" id="{E80D1D6E-4AAC-7846-8DFF-E558CD90AA95}"/>
+              </a:ext>
+            </a:extLst>
+          </p:cNvPr>
+          <p:cNvSpPr txBox="1"/>
+          <p:nvPr/>
+        </p:nvSpPr>
+        <p:spPr bwMode="auto">
+          <a:xfrm>
+            <a:off x="5431078" y="4714973"/>
+            <a:ext cx="1604484" cy="369332"/>
+          </a:xfrm>
+          <a:prstGeom prst="rect">
+            <a:avLst/>
+          </a:prstGeom>
+          <a:noFill/>
+          <a:ln w="9525">
+            <a:noFill/>
+            <a:miter lim="800000"/>
+            <a:headEnd/>
+            <a:tailEnd/>
+          </a:ln>
+        </p:spPr>
+        <p:txBody>
+          <a:bodyPr vert="horz" wrap="square" lIns="91440" tIns="45720" rIns="91440" bIns="45720" numCol="1" rtlCol="0" anchor="t" anchorCtr="0" compatLnSpc="1">
+            <a:prstTxWarp prst="textNoShape">
+              <a:avLst/>
+            </a:prstTxWarp>
+            <a:spAutoFit/>
+          </a:bodyPr>
+          <a:lstStyle/>
+          <a:p>
+            <a:pPr algn="ctr" fontAlgn="base">
+              <a:spcBef>
+                <a:spcPts val="720"/>
+              </a:spcBef>
+              <a:spcAft>
+                <a:spcPct val="0"/>
+              </a:spcAft>
+              <a:defRPr/>
+            </a:pPr>
+            <a:r>
+              <a:rPr lang="en-US" dirty="0" err="1">
+                <a:solidFill>
+                  <a:srgbClr val="E67300"/>
+                </a:solidFill>
+              </a:rPr>
+              <a:t>kendoui.com</a:t>
+            </a:r>
+            <a:endParaRPr lang="en-US" dirty="0">
+              <a:solidFill>
+                <a:srgbClr val="E67300"/>
+              </a:solidFill>
+            </a:endParaRPr>
+          </a:p>
+        </p:txBody>
+      </p:sp>
+      <p:sp>
+        <p:nvSpPr>
+          <p:cNvPr id="43" name="TextBox 42">
+            <a:extLst>
+              <a:ext uri="{FF2B5EF4-FFF2-40B4-BE49-F238E27FC236}">
+                <a16:creationId xmlns:a16="http://schemas.microsoft.com/office/drawing/2014/main" id="{4B3993DF-9789-8645-B64F-030EDEC5E7E6}"/>
+              </a:ext>
+            </a:extLst>
+          </p:cNvPr>
+          <p:cNvSpPr txBox="1"/>
+          <p:nvPr/>
+        </p:nvSpPr>
+        <p:spPr bwMode="auto">
+          <a:xfrm>
+            <a:off x="9381829" y="4714973"/>
+            <a:ext cx="1888137" cy="369332"/>
+          </a:xfrm>
+          <a:prstGeom prst="rect">
+            <a:avLst/>
+          </a:prstGeom>
+          <a:noFill/>
+          <a:ln w="9525">
+            <a:noFill/>
+            <a:miter lim="800000"/>
+            <a:headEnd/>
+            <a:tailEnd/>
+          </a:ln>
+        </p:spPr>
+        <p:txBody>
+          <a:bodyPr vert="horz" wrap="square" lIns="91440" tIns="45720" rIns="91440" bIns="45720" numCol="1" rtlCol="0" anchor="t" anchorCtr="0" compatLnSpc="1">
+            <a:prstTxWarp prst="textNoShape">
+              <a:avLst/>
+            </a:prstTxWarp>
+            <a:spAutoFit/>
+          </a:bodyPr>
+          <a:lstStyle/>
+          <a:p>
+            <a:pPr algn="ctr" fontAlgn="base">
+              <a:spcBef>
+                <a:spcPts val="720"/>
+              </a:spcBef>
+              <a:spcAft>
+                <a:spcPct val="0"/>
+              </a:spcAft>
+              <a:defRPr/>
+            </a:pPr>
+            <a:r>
+              <a:rPr lang="en-US" dirty="0" err="1">
+                <a:solidFill>
+                  <a:srgbClr val="E67300"/>
+                </a:solidFill>
+              </a:rPr>
+              <a:t>nativescript.org</a:t>
+            </a:r>
+            <a:endParaRPr lang="en-US" dirty="0">
+              <a:solidFill>
+                <a:srgbClr val="E67300"/>
+              </a:solidFill>
+            </a:endParaRPr>
+          </a:p>
+        </p:txBody>
+      </p:sp>
+      <p:sp>
+        <p:nvSpPr>
+          <p:cNvPr id="2" name="Text Placeholder 10">
+            <a:extLst>
+              <a:ext uri="{FF2B5EF4-FFF2-40B4-BE49-F238E27FC236}">
+                <a16:creationId xmlns:a16="http://schemas.microsoft.com/office/drawing/2014/main" id="{4D6CB861-1E77-44E7-B706-F9073D58A25C}"/>
+              </a:ext>
+            </a:extLst>
+          </p:cNvPr>
+          <p:cNvSpPr txBox="1">
+            <a:spLocks/>
+          </p:cNvSpPr>
+          <p:nvPr/>
+        </p:nvSpPr>
+        <p:spPr>
+          <a:xfrm>
+            <a:off x="332872" y="939508"/>
+            <a:ext cx="9287348" cy="327457"/>
+          </a:xfrm>
+          <a:prstGeom prst="rect">
+            <a:avLst/>
+          </a:prstGeom>
+        </p:spPr>
+        <p:txBody>
+          <a:bodyPr anchor="t">
+            <a:noAutofit/>
+          </a:bodyPr>
+          <a:lstStyle>
+            <a:lvl1pPr marL="342694" indent="-342694" algn="l" defTabSz="913852" rtl="0" eaLnBrk="1" fontAlgn="base" latinLnBrk="0" hangingPunct="1">
+              <a:spcBef>
+                <a:spcPts val="900"/>
+              </a:spcBef>
+              <a:spcAft>
+                <a:spcPct val="0"/>
+              </a:spcAft>
+              <a:buClr>
+                <a:srgbClr val="5CE500"/>
+              </a:buClr>
+              <a:buFont typeface="Wingdings" pitchFamily="2" charset="2"/>
+              <a:buChar char="§"/>
+              <a:defRPr lang="en-US" sz="2400" kern="1200" dirty="0" smtClean="0">
+                <a:solidFill>
+                  <a:schemeClr val="tx1"/>
+                </a:solidFill>
+                <a:latin typeface="Lato" panose="020F0502020204030203" pitchFamily="34" charset="0"/>
+                <a:ea typeface="+mn-ea"/>
+                <a:cs typeface="Lato" panose="020F0502020204030203" pitchFamily="34" charset="0"/>
+              </a:defRPr>
+            </a:lvl1pPr>
+            <a:lvl2pPr marL="742504" indent="-285578" algn="l" defTabSz="913852" rtl="0" eaLnBrk="1" fontAlgn="base" latinLnBrk="0" hangingPunct="1">
+              <a:spcBef>
+                <a:spcPts val="900"/>
+              </a:spcBef>
+              <a:spcAft>
+                <a:spcPct val="0"/>
+              </a:spcAft>
+              <a:buClr>
+                <a:srgbClr val="5CE500"/>
+              </a:buClr>
+              <a:buChar char="•"/>
+              <a:defRPr lang="en-US" sz="2000" kern="1200" dirty="0" smtClean="0">
+                <a:solidFill>
+                  <a:schemeClr val="tx1"/>
+                </a:solidFill>
+                <a:latin typeface="Lato" panose="020F0502020204030203" pitchFamily="34" charset="0"/>
+                <a:ea typeface="+mn-ea"/>
+                <a:cs typeface="Lato" panose="020F0502020204030203" pitchFamily="34" charset="0"/>
+              </a:defRPr>
+            </a:lvl2pPr>
+            <a:lvl3pPr marL="1142314" indent="-228462" algn="l" defTabSz="913852" rtl="0" eaLnBrk="1" fontAlgn="base" latinLnBrk="0" hangingPunct="1">
+              <a:spcBef>
+                <a:spcPts val="900"/>
+              </a:spcBef>
+              <a:spcAft>
+                <a:spcPct val="0"/>
+              </a:spcAft>
+              <a:buClr>
+                <a:srgbClr val="5CE500"/>
+              </a:buClr>
+              <a:buFont typeface="Arial" charset="0"/>
+              <a:buChar char="–"/>
+              <a:defRPr lang="en-US" sz="2000" kern="1200" dirty="0" smtClean="0">
+                <a:solidFill>
+                  <a:schemeClr val="tx1"/>
+                </a:solidFill>
+                <a:latin typeface="Lato" panose="020F0502020204030203" pitchFamily="34" charset="0"/>
+                <a:ea typeface="+mn-ea"/>
+                <a:cs typeface="Lato" panose="020F0502020204030203" pitchFamily="34" charset="0"/>
+              </a:defRPr>
+            </a:lvl3pPr>
+            <a:lvl4pPr marL="1599240" indent="-228462" algn="l" defTabSz="913852" rtl="0" eaLnBrk="1" fontAlgn="base" latinLnBrk="0" hangingPunct="1">
+              <a:spcBef>
+                <a:spcPts val="900"/>
+              </a:spcBef>
+              <a:spcAft>
+                <a:spcPct val="0"/>
+              </a:spcAft>
+              <a:buClr>
+                <a:srgbClr val="5CE500"/>
+              </a:buClr>
+              <a:buSzPct val="95000"/>
+              <a:buFont typeface="Courier New" pitchFamily="49" charset="0"/>
+              <a:buChar char="o"/>
+              <a:defRPr lang="en-US" sz="1800" kern="1200" dirty="0" smtClean="0">
+                <a:solidFill>
+                  <a:schemeClr val="tx1"/>
+                </a:solidFill>
+                <a:latin typeface="Lato" panose="020F0502020204030203" pitchFamily="34" charset="0"/>
+                <a:ea typeface="+mn-ea"/>
+                <a:cs typeface="Lato" panose="020F0502020204030203" pitchFamily="34" charset="0"/>
+              </a:defRPr>
+            </a:lvl4pPr>
+            <a:lvl5pPr marL="2056166" indent="-228462" algn="l" defTabSz="913852" rtl="0" eaLnBrk="1" fontAlgn="base" latinLnBrk="0" hangingPunct="1">
+              <a:spcBef>
+                <a:spcPts val="900"/>
+              </a:spcBef>
+              <a:spcAft>
+                <a:spcPct val="0"/>
+              </a:spcAft>
+              <a:buClr>
+                <a:schemeClr val="accent2"/>
+              </a:buClr>
+              <a:buSzPct val="95000"/>
+              <a:buFont typeface="Courier New" pitchFamily="49" charset="0"/>
+              <a:buChar char="o"/>
+              <a:defRPr lang="en-US" sz="1400" kern="1200" dirty="0" smtClean="0">
+                <a:solidFill>
+                  <a:srgbClr val="000000"/>
+                </a:solidFill>
+                <a:latin typeface="Arial" pitchFamily="34" charset="0"/>
+                <a:ea typeface="+mn-ea"/>
+                <a:cs typeface="Arial" pitchFamily="34" charset="0"/>
+              </a:defRPr>
+            </a:lvl5pPr>
+            <a:lvl6pPr marL="2513092" indent="-228462" algn="l" rtl="0" eaLnBrk="1" fontAlgn="base" hangingPunct="1">
+              <a:spcBef>
+                <a:spcPct val="20000"/>
+              </a:spcBef>
+              <a:spcAft>
+                <a:spcPct val="0"/>
+              </a:spcAft>
+              <a:buClr>
+                <a:schemeClr val="accent1"/>
+              </a:buClr>
+              <a:buFont typeface="Arial" charset="0"/>
+              <a:buChar char="•"/>
+              <a:defRPr sz="1998">
+                <a:solidFill>
+                  <a:schemeClr val="tx1"/>
+                </a:solidFill>
+                <a:latin typeface="+mn-lt"/>
+              </a:defRPr>
+            </a:lvl6pPr>
+            <a:lvl7pPr marL="2970017" indent="-228462" algn="l" rtl="0" eaLnBrk="1" fontAlgn="base" hangingPunct="1">
+              <a:spcBef>
+                <a:spcPct val="20000"/>
+              </a:spcBef>
+              <a:spcAft>
+                <a:spcPct val="0"/>
+              </a:spcAft>
+              <a:buClr>
+                <a:schemeClr val="accent1"/>
+              </a:buClr>
+              <a:buFont typeface="Arial" charset="0"/>
+              <a:buChar char="•"/>
+              <a:defRPr sz="1998">
+                <a:solidFill>
+                  <a:schemeClr val="tx1"/>
+                </a:solidFill>
+                <a:latin typeface="+mn-lt"/>
+              </a:defRPr>
+            </a:lvl7pPr>
+            <a:lvl8pPr marL="3426943" indent="-228462" algn="l" rtl="0" eaLnBrk="1" fontAlgn="base" hangingPunct="1">
+              <a:spcBef>
+                <a:spcPct val="20000"/>
+              </a:spcBef>
+              <a:spcAft>
+                <a:spcPct val="0"/>
+              </a:spcAft>
+              <a:buClr>
+                <a:schemeClr val="accent1"/>
+              </a:buClr>
+              <a:buFont typeface="Arial" charset="0"/>
+              <a:buChar char="•"/>
+              <a:defRPr sz="1998">
+                <a:solidFill>
+                  <a:schemeClr val="tx1"/>
+                </a:solidFill>
+                <a:latin typeface="+mn-lt"/>
+              </a:defRPr>
+            </a:lvl8pPr>
+            <a:lvl9pPr marL="3883868" indent="-228462" algn="l" rtl="0" eaLnBrk="1" fontAlgn="base" hangingPunct="1">
+              <a:spcBef>
+                <a:spcPct val="20000"/>
+              </a:spcBef>
+              <a:spcAft>
+                <a:spcPct val="0"/>
+              </a:spcAft>
+              <a:buClr>
+                <a:schemeClr val="accent1"/>
+              </a:buClr>
+              <a:buFont typeface="Arial" charset="0"/>
+              <a:buChar char="•"/>
+              <a:defRPr sz="1998">
+                <a:solidFill>
+                  <a:schemeClr val="tx1"/>
+                </a:solidFill>
+                <a:latin typeface="+mn-lt"/>
+              </a:defRPr>
+            </a:lvl9pPr>
+          </a:lstStyle>
+          <a:p>
+            <a:pPr marL="342265" indent="-342265" algn="ctr">
+              <a:buNone/>
+              <a:defRPr/>
+            </a:pPr>
+            <a:r>
+              <a:rPr lang="en-AU" dirty="0">
+                <a:solidFill>
+                  <a:srgbClr val="373A3E"/>
+                </a:solidFill>
+              </a:rPr>
+              <a:t>Thanks</a:t>
+            </a:r>
+            <a:r>
+              <a:rPr lang="en-AU" dirty="0"/>
+              <a:t> to our sponsor</a:t>
+            </a:r>
+            <a:endParaRPr lang="en-US" dirty="0"/>
+          </a:p>
+        </p:txBody>
+      </p:sp>
     </p:spTree>
     <p:extLst>
       <p:ext uri="{BB962C8B-B14F-4D97-AF65-F5344CB8AC3E}">
-        <p14:creationId xmlns:p14="http://schemas.microsoft.com/office/powerpoint/2010/main" val="324178724"/>
+        <p14:creationId xmlns:p14="http://schemas.microsoft.com/office/powerpoint/2010/main" val="2063185717"/>
       </p:ext>
     </p:extLst>
   </p:cSld>
   <p:clrMapOvr>
     <a:masterClrMapping/>
   </p:clrMapOvr>
-  <mc:AlternateContent xmlns:mc="http://schemas.openxmlformats.org/markup-compatibility/2006" xmlns:p14="http://schemas.microsoft.com/office/powerpoint/2010/main">
-    <mc:Choice Requires="p14">
-      <p:transition spd="slow" p14:dur="2000" advTm="10000"/>
-    </mc:Choice>
-    <mc:Fallback xmlns="">
-      <p:transition spd="slow" advTm="10000"/>
-    </mc:Fallback>
-  </mc:AlternateContent>
+  <p:transition spd="slow">
+    <p:push dir="u"/>
+  </p:transition>
 </p:sld>
 </file>
 
@@ -4406,7 +6183,7 @@
           <p:cNvPr id="2" name="Title 1">
             <a:extLst>
               <a:ext uri="{FF2B5EF4-FFF2-40B4-BE49-F238E27FC236}">
-                <a16:creationId xmlns:a16="http://schemas.microsoft.com/office/drawing/2014/main" xmlns="" id="{EA8CD7F1-5168-4CFC-93AC-9F6D16F3B02D}"/>
+                <a16:creationId xmlns:a16="http://schemas.microsoft.com/office/drawing/2014/main" id="{993D9999-0877-4B24-883F-9BA46046EF60}"/>
               </a:ext>
             </a:extLst>
           </p:cNvPr>
@@ -4424,18 +6201,19 @@
           <a:p>
             <a:pPr algn="ctr"/>
             <a:r>
-              <a:rPr lang="en-US" b="1" dirty="0"/>
-              <a:t>2019 HACKATHON</a:t>
-            </a:r>
-          </a:p>
-        </p:txBody>
-      </p:sp>
-      <p:sp>
-        <p:nvSpPr>
-          <p:cNvPr id="3" name="Content Placeholder 2">
-            <a:extLst>
-              <a:ext uri="{FF2B5EF4-FFF2-40B4-BE49-F238E27FC236}">
-                <a16:creationId xmlns:a16="http://schemas.microsoft.com/office/drawing/2014/main" xmlns="" id="{7A216D7F-7D2D-4A78-AABE-D498C301F8E6}"/>
+              <a:rPr lang="en-US" b="1"/>
+              <a:t>VueConf.US 2019</a:t>
+            </a:r>
+            <a:endParaRPr lang="en-US" b="1" dirty="0"/>
+          </a:p>
+        </p:txBody>
+      </p:sp>
+      <p:sp>
+        <p:nvSpPr>
+          <p:cNvPr id="5" name="Content Placeholder 4">
+            <a:extLst>
+              <a:ext uri="{FF2B5EF4-FFF2-40B4-BE49-F238E27FC236}">
+                <a16:creationId xmlns:a16="http://schemas.microsoft.com/office/drawing/2014/main" id="{2FAC6001-E38D-4664-86A1-BE2B5BF6BE52}"/>
               </a:ext>
             </a:extLst>
           </p:cNvPr>
@@ -4448,62 +6226,90 @@
         </p:nvSpPr>
         <p:spPr/>
         <p:txBody>
-          <a:bodyPr/>
+          <a:bodyPr>
+            <a:normAutofit/>
+          </a:bodyPr>
           <a:lstStyle/>
           <a:p>
             <a:r>
               <a:rPr lang="en-US" dirty="0"/>
-              <a:t>February 2019, exact date(s) TBD</a:t>
-            </a:r>
-          </a:p>
-          <a:p>
+              <a:t>$50 off Main Conference</a:t>
+            </a:r>
+          </a:p>
+          <a:p>
+            <a:pPr lvl="1"/>
+            <a:r>
+              <a:rPr lang="en-US" dirty="0"/>
+              <a:t>VUECONFMTUP50</a:t>
+            </a:r>
+          </a:p>
+          <a:p>
+            <a:pPr marL="457200" lvl="1" indent="0">
+              <a:buNone/>
+            </a:pPr>
             <a:endParaRPr lang="en-US" dirty="0"/>
           </a:p>
           <a:p>
             <a:r>
               <a:rPr lang="en-US" dirty="0"/>
-              <a:t>Build a </a:t>
-            </a:r>
-            <a:r>
-              <a:rPr lang="en-US" dirty="0" err="1"/>
-              <a:t>VueJS</a:t>
-            </a:r>
+              <a:t>$100 off Main Conference + Workshop	</a:t>
+            </a:r>
+          </a:p>
+          <a:p>
+            <a:pPr lvl="1"/>
             <a:r>
               <a:rPr lang="en-US" dirty="0"/>
-              <a:t> Website for a Local Non-Profit!</a:t>
-            </a:r>
-          </a:p>
-          <a:p>
-            <a:pPr lvl="1"/>
+              <a:t>VUECONFMTUP-WORKSHOP100</a:t>
+            </a:r>
+          </a:p>
+          <a:p>
+            <a:pPr marL="457200" lvl="1" indent="0">
+              <a:buNone/>
+            </a:pPr>
+            <a:endParaRPr lang="en-US" dirty="0"/>
+          </a:p>
+          <a:p>
             <a:r>
               <a:rPr lang="en-US" dirty="0"/>
-              <a:t>If you know of a non-profit, please nominate them!</a:t>
-            </a:r>
-          </a:p>
-          <a:p>
-            <a:pPr lvl="2"/>
-            <a:r>
-              <a:rPr lang="en-US" dirty="0"/>
-              <a:t>Email </a:t>
-            </a:r>
-            <a:r>
-              <a:rPr lang="en-US" dirty="0">
-                <a:hlinkClick r:id="rId2"/>
-              </a:rPr>
-              <a:t>vue.columbus@outlook.com</a:t>
-            </a:r>
-            <a:endParaRPr lang="en-US" dirty="0"/>
-          </a:p>
-          <a:p>
-            <a:pPr lvl="2"/>
-            <a:endParaRPr lang="en-US" dirty="0"/>
-          </a:p>
-        </p:txBody>
-      </p:sp>
+              <a:t>THREE WEEKS TO USE!</a:t>
+            </a:r>
+          </a:p>
+        </p:txBody>
+      </p:sp>
+      <p:pic>
+        <p:nvPicPr>
+          <p:cNvPr id="3" name="Picture 2"/>
+          <p:cNvPicPr>
+            <a:picLocks noChangeAspect="1"/>
+          </p:cNvPicPr>
+          <p:nvPr/>
+        </p:nvPicPr>
+        <p:blipFill>
+          <a:blip r:embed="rId2">
+            <a:extLst>
+              <a:ext uri="{28A0092B-C50C-407E-A947-70E740481C1C}">
+                <a14:useLocalDpi xmlns:a14="http://schemas.microsoft.com/office/drawing/2010/main" val="0"/>
+              </a:ext>
+            </a:extLst>
+          </a:blip>
+          <a:stretch>
+            <a:fillRect/>
+          </a:stretch>
+        </p:blipFill>
+        <p:spPr>
+          <a:xfrm>
+            <a:off x="7875840" y="2368799"/>
+            <a:ext cx="3477960" cy="3471126"/>
+          </a:xfrm>
+          <a:prstGeom prst="rect">
+            <a:avLst/>
+          </a:prstGeom>
+        </p:spPr>
+      </p:pic>
     </p:spTree>
     <p:extLst>
       <p:ext uri="{BB962C8B-B14F-4D97-AF65-F5344CB8AC3E}">
-        <p14:creationId xmlns:p14="http://schemas.microsoft.com/office/powerpoint/2010/main" val="1003918304"/>
+        <p14:creationId xmlns:p14="http://schemas.microsoft.com/office/powerpoint/2010/main" val="324178724"/>
       </p:ext>
     </p:extLst>
   </p:cSld>
@@ -4543,7 +6349,144 @@
           <p:cNvPr id="2" name="Title 1">
             <a:extLst>
               <a:ext uri="{FF2B5EF4-FFF2-40B4-BE49-F238E27FC236}">
-                <a16:creationId xmlns:a16="http://schemas.microsoft.com/office/drawing/2014/main" xmlns="" id="{B5F4EF3C-DA9F-4B61-9CD6-CBF44A8564A8}"/>
+                <a16:creationId xmlns:a16="http://schemas.microsoft.com/office/drawing/2014/main" id="{EA8CD7F1-5168-4CFC-93AC-9F6D16F3B02D}"/>
+              </a:ext>
+            </a:extLst>
+          </p:cNvPr>
+          <p:cNvSpPr>
+            <a:spLocks noGrp="1"/>
+          </p:cNvSpPr>
+          <p:nvPr>
+            <p:ph type="title"/>
+          </p:nvPr>
+        </p:nvSpPr>
+        <p:spPr/>
+        <p:txBody>
+          <a:bodyPr/>
+          <a:lstStyle/>
+          <a:p>
+            <a:pPr algn="ctr"/>
+            <a:r>
+              <a:rPr lang="en-US" b="1" dirty="0"/>
+              <a:t>2019 HACKATHON</a:t>
+            </a:r>
+          </a:p>
+        </p:txBody>
+      </p:sp>
+      <p:sp>
+        <p:nvSpPr>
+          <p:cNvPr id="3" name="Content Placeholder 2">
+            <a:extLst>
+              <a:ext uri="{FF2B5EF4-FFF2-40B4-BE49-F238E27FC236}">
+                <a16:creationId xmlns:a16="http://schemas.microsoft.com/office/drawing/2014/main" id="{7A216D7F-7D2D-4A78-AABE-D498C301F8E6}"/>
+              </a:ext>
+            </a:extLst>
+          </p:cNvPr>
+          <p:cNvSpPr>
+            <a:spLocks noGrp="1"/>
+          </p:cNvSpPr>
+          <p:nvPr>
+            <p:ph idx="1"/>
+          </p:nvPr>
+        </p:nvSpPr>
+        <p:spPr/>
+        <p:txBody>
+          <a:bodyPr/>
+          <a:lstStyle/>
+          <a:p>
+            <a:r>
+              <a:rPr lang="en-US" dirty="0"/>
+              <a:t>February 2019, exact date(s) TBD</a:t>
+            </a:r>
+          </a:p>
+          <a:p>
+            <a:endParaRPr lang="en-US" dirty="0"/>
+          </a:p>
+          <a:p>
+            <a:r>
+              <a:rPr lang="en-US" dirty="0"/>
+              <a:t>Build a </a:t>
+            </a:r>
+            <a:r>
+              <a:rPr lang="en-US" dirty="0" err="1"/>
+              <a:t>VueJS</a:t>
+            </a:r>
+            <a:r>
+              <a:rPr lang="en-US" dirty="0"/>
+              <a:t> Website for a Local Non-Profit!</a:t>
+            </a:r>
+          </a:p>
+          <a:p>
+            <a:pPr lvl="1"/>
+            <a:r>
+              <a:rPr lang="en-US" dirty="0"/>
+              <a:t>If you know of a non-profit, please nominate them!</a:t>
+            </a:r>
+          </a:p>
+          <a:p>
+            <a:pPr lvl="2"/>
+            <a:r>
+              <a:rPr lang="en-US" dirty="0"/>
+              <a:t>Email </a:t>
+            </a:r>
+            <a:r>
+              <a:rPr lang="en-US" dirty="0">
+                <a:hlinkClick r:id="rId2"/>
+              </a:rPr>
+              <a:t>vue.columbus@outlook.com</a:t>
+            </a:r>
+            <a:endParaRPr lang="en-US" dirty="0"/>
+          </a:p>
+          <a:p>
+            <a:pPr lvl="2"/>
+            <a:endParaRPr lang="en-US" dirty="0"/>
+          </a:p>
+        </p:txBody>
+      </p:sp>
+    </p:spTree>
+    <p:extLst>
+      <p:ext uri="{BB962C8B-B14F-4D97-AF65-F5344CB8AC3E}">
+        <p14:creationId xmlns:p14="http://schemas.microsoft.com/office/powerpoint/2010/main" val="1003918304"/>
+      </p:ext>
+    </p:extLst>
+  </p:cSld>
+  <p:clrMapOvr>
+    <a:masterClrMapping/>
+  </p:clrMapOvr>
+  <mc:AlternateContent xmlns:mc="http://schemas.openxmlformats.org/markup-compatibility/2006" xmlns:p14="http://schemas.microsoft.com/office/powerpoint/2010/main">
+    <mc:Choice Requires="p14">
+      <p:transition spd="slow" p14:dur="2000" advTm="10000"/>
+    </mc:Choice>
+    <mc:Fallback xmlns="">
+      <p:transition spd="slow" advTm="10000"/>
+    </mc:Fallback>
+  </mc:AlternateContent>
+</p:sld>
+</file>
+
+<file path=ppt/slides/slide8.xml><?xml version="1.0" encoding="utf-8"?>
+<p:sld xmlns:a="http://schemas.openxmlformats.org/drawingml/2006/main" xmlns:r="http://schemas.openxmlformats.org/officeDocument/2006/relationships" xmlns:p="http://schemas.openxmlformats.org/presentationml/2006/main">
+  <p:cSld>
+    <p:spTree>
+      <p:nvGrpSpPr>
+        <p:cNvPr id="1" name=""/>
+        <p:cNvGrpSpPr/>
+        <p:nvPr/>
+      </p:nvGrpSpPr>
+      <p:grpSpPr>
+        <a:xfrm>
+          <a:off x="0" y="0"/>
+          <a:ext cx="0" cy="0"/>
+          <a:chOff x="0" y="0"/>
+          <a:chExt cx="0" cy="0"/>
+        </a:xfrm>
+      </p:grpSpPr>
+      <p:sp>
+        <p:nvSpPr>
+          <p:cNvPr id="2" name="Title 1">
+            <a:extLst>
+              <a:ext uri="{FF2B5EF4-FFF2-40B4-BE49-F238E27FC236}">
+                <a16:creationId xmlns:a16="http://schemas.microsoft.com/office/drawing/2014/main" id="{B5F4EF3C-DA9F-4B61-9CD6-CBF44A8564A8}"/>
               </a:ext>
             </a:extLst>
           </p:cNvPr>
@@ -4577,7 +6520,7 @@
           <p:cNvPr id="4" name="Content Placeholder 3">
             <a:extLst>
               <a:ext uri="{FF2B5EF4-FFF2-40B4-BE49-F238E27FC236}">
-                <a16:creationId xmlns:a16="http://schemas.microsoft.com/office/drawing/2014/main" xmlns="" id="{46B6874B-C795-4DEA-A7DC-58CDB92C42A7}"/>
+                <a16:creationId xmlns:a16="http://schemas.microsoft.com/office/drawing/2014/main" id="{46B6874B-C795-4DEA-A7DC-58CDB92C42A7}"/>
               </a:ext>
             </a:extLst>
           </p:cNvPr>
@@ -4608,31 +6551,27 @@
           <a:p>
             <a:pPr lvl="1"/>
             <a:r>
-              <a:rPr lang="en-US" dirty="0" smtClean="0"/>
+              <a:rPr lang="en-US" dirty="0"/>
               <a:t>James </a:t>
             </a:r>
             <a:r>
-              <a:rPr lang="en-US" dirty="0" err="1" smtClean="0"/>
-              <a:t>Mac</a:t>
-            </a:r>
-            <a:r>
-              <a:rPr lang="en-US" dirty="0" err="1" smtClean="0"/>
-              <a:t>Ivor</a:t>
-            </a:r>
-            <a:r>
-              <a:rPr lang="en-US" dirty="0" smtClean="0"/>
+              <a:rPr lang="en-US" dirty="0" err="1"/>
+              <a:t>MacIvor</a:t>
+            </a:r>
+            <a:r>
+              <a:rPr lang="en-US" dirty="0"/>
               <a:t> – </a:t>
             </a:r>
             <a:r>
-              <a:rPr lang="en-US" dirty="0" err="1" smtClean="0"/>
+              <a:rPr lang="en-US" dirty="0" err="1"/>
               <a:t>Nuxt</a:t>
             </a:r>
             <a:r>
-              <a:rPr lang="en-US" dirty="0" smtClean="0"/>
+              <a:rPr lang="en-US" dirty="0"/>
               <a:t> Level </a:t>
             </a:r>
             <a:r>
-              <a:rPr lang="en-US" dirty="0" err="1" smtClean="0"/>
+              <a:rPr lang="en-US" dirty="0" err="1"/>
               <a:t>Vue</a:t>
             </a:r>
             <a:endParaRPr lang="en-US" dirty="0"/>
@@ -4709,7 +6648,7 @@
           <p:cNvPr id="5" name="Content Placeholder 4">
             <a:extLst>
               <a:ext uri="{FF2B5EF4-FFF2-40B4-BE49-F238E27FC236}">
-                <a16:creationId xmlns:a16="http://schemas.microsoft.com/office/drawing/2014/main" xmlns="" id="{5A727926-0244-4C34-A938-CE0CBA11E17F}"/>
+                <a16:creationId xmlns:a16="http://schemas.microsoft.com/office/drawing/2014/main" id="{5A727926-0244-4C34-A938-CE0CBA11E17F}"/>
               </a:ext>
             </a:extLst>
           </p:cNvPr>

</xml_diff>